<commit_message>
slides for June 18th 2020
</commit_message>
<xml_diff>
--- a/iotschema-20200521.pptx
+++ b/iotschema-20200521.pptx
@@ -15,8 +15,8 @@
     <p:sldId id="298" r:id="rId6"/>
     <p:sldId id="296" r:id="rId7"/>
     <p:sldId id="289" r:id="rId8"/>
-    <p:sldId id="278" r:id="rId9"/>
-    <p:sldId id="280" r:id="rId10"/>
+    <p:sldId id="280" r:id="rId9"/>
+    <p:sldId id="278" r:id="rId10"/>
     <p:sldId id="297" r:id="rId11"/>
     <p:sldId id="299" r:id="rId12"/>
     <p:sldId id="300" r:id="rId13"/>
@@ -213,7 +213,7 @@
           <a:p>
             <a:fld id="{5FCBBBB3-5D7B-284E-801E-D00035F0C91A}" type="datetimeFigureOut">
               <a:rPr lang="en-US" smtClean="0"/>
-              <a:t>5/21/20</a:t>
+              <a:t>5/28/20</a:t>
             </a:fld>
             <a:endParaRPr lang="en-US"/>
           </a:p>
@@ -695,7 +695,7 @@
           <a:p>
             <a:fld id="{F774572E-0D61-7C4C-A97B-03BC6FC8585C}" type="datetimeFigureOut">
               <a:rPr lang="en-US" smtClean="0"/>
-              <a:t>5/21/20</a:t>
+              <a:t>5/28/20</a:t>
             </a:fld>
             <a:endParaRPr lang="en-US"/>
           </a:p>
@@ -860,7 +860,7 @@
           <a:p>
             <a:fld id="{F774572E-0D61-7C4C-A97B-03BC6FC8585C}" type="datetimeFigureOut">
               <a:rPr lang="en-US" smtClean="0"/>
-              <a:t>5/21/20</a:t>
+              <a:t>5/28/20</a:t>
             </a:fld>
             <a:endParaRPr lang="en-US"/>
           </a:p>
@@ -1035,7 +1035,7 @@
           <a:p>
             <a:fld id="{F774572E-0D61-7C4C-A97B-03BC6FC8585C}" type="datetimeFigureOut">
               <a:rPr lang="en-US" smtClean="0"/>
-              <a:t>5/21/20</a:t>
+              <a:t>5/28/20</a:t>
             </a:fld>
             <a:endParaRPr lang="en-US"/>
           </a:p>
@@ -1200,7 +1200,7 @@
           <a:p>
             <a:fld id="{F774572E-0D61-7C4C-A97B-03BC6FC8585C}" type="datetimeFigureOut">
               <a:rPr lang="en-US" smtClean="0"/>
-              <a:t>5/21/20</a:t>
+              <a:t>5/28/20</a:t>
             </a:fld>
             <a:endParaRPr lang="en-US"/>
           </a:p>
@@ -1439,7 +1439,7 @@
           <a:p>
             <a:fld id="{F774572E-0D61-7C4C-A97B-03BC6FC8585C}" type="datetimeFigureOut">
               <a:rPr lang="en-US" smtClean="0"/>
-              <a:t>5/21/20</a:t>
+              <a:t>5/28/20</a:t>
             </a:fld>
             <a:endParaRPr lang="en-US"/>
           </a:p>
@@ -1666,7 +1666,7 @@
           <a:p>
             <a:fld id="{F774572E-0D61-7C4C-A97B-03BC6FC8585C}" type="datetimeFigureOut">
               <a:rPr lang="en-US" smtClean="0"/>
-              <a:t>5/21/20</a:t>
+              <a:t>5/28/20</a:t>
             </a:fld>
             <a:endParaRPr lang="en-US"/>
           </a:p>
@@ -2028,7 +2028,7 @@
           <a:p>
             <a:fld id="{F774572E-0D61-7C4C-A97B-03BC6FC8585C}" type="datetimeFigureOut">
               <a:rPr lang="en-US" smtClean="0"/>
-              <a:t>5/21/20</a:t>
+              <a:t>5/28/20</a:t>
             </a:fld>
             <a:endParaRPr lang="en-US"/>
           </a:p>
@@ -2141,7 +2141,7 @@
           <a:p>
             <a:fld id="{F774572E-0D61-7C4C-A97B-03BC6FC8585C}" type="datetimeFigureOut">
               <a:rPr lang="en-US" smtClean="0"/>
-              <a:t>5/21/20</a:t>
+              <a:t>5/28/20</a:t>
             </a:fld>
             <a:endParaRPr lang="en-US"/>
           </a:p>
@@ -2231,7 +2231,7 @@
           <a:p>
             <a:fld id="{F774572E-0D61-7C4C-A97B-03BC6FC8585C}" type="datetimeFigureOut">
               <a:rPr lang="en-US" smtClean="0"/>
-              <a:t>5/21/20</a:t>
+              <a:t>5/28/20</a:t>
             </a:fld>
             <a:endParaRPr lang="en-US"/>
           </a:p>
@@ -2503,7 +2503,7 @@
           <a:p>
             <a:fld id="{F774572E-0D61-7C4C-A97B-03BC6FC8585C}" type="datetimeFigureOut">
               <a:rPr lang="en-US" smtClean="0"/>
-              <a:t>5/21/20</a:t>
+              <a:t>5/28/20</a:t>
             </a:fld>
             <a:endParaRPr lang="en-US"/>
           </a:p>
@@ -2755,7 +2755,7 @@
           <a:p>
             <a:fld id="{F774572E-0D61-7C4C-A97B-03BC6FC8585C}" type="datetimeFigureOut">
               <a:rPr lang="en-US" smtClean="0"/>
-              <a:t>5/21/20</a:t>
+              <a:t>5/28/20</a:t>
             </a:fld>
             <a:endParaRPr lang="en-US"/>
           </a:p>
@@ -2963,7 +2963,7 @@
           <a:p>
             <a:fld id="{F774572E-0D61-7C4C-A97B-03BC6FC8585C}" type="datetimeFigureOut">
               <a:rPr lang="en-US" smtClean="0"/>
-              <a:t>5/21/20</a:t>
+              <a:t>5/28/20</a:t>
             </a:fld>
             <a:endParaRPr lang="en-US"/>
           </a:p>
@@ -3424,12 +3424,8 @@
           </a:p>
           <a:p>
             <a:r>
-              <a:rPr lang="en-US" dirty="0" smtClean="0"/>
-              <a:t>Mai 21, </a:t>
-            </a:r>
-            <a:r>
-              <a:rPr lang="en-US" dirty="0"/>
-              <a:t>2020</a:t>
+              <a:rPr lang="en-US" dirty="0"/>
+              <a:t>Mai 21, 2020</a:t>
             </a:r>
           </a:p>
         </p:txBody>
@@ -3486,13 +3482,8 @@
           <a:p>
             <a:r>
               <a:rPr lang="en-US" dirty="0"/>
-              <a:t>High </a:t>
-            </a:r>
-            <a:r>
-              <a:rPr lang="en-US" dirty="0" smtClean="0"/>
-              <a:t>Level Integration Patterns  </a:t>
-            </a:r>
-            <a:endParaRPr lang="en-US" dirty="0"/>
+              <a:t>High Level Integration Patterns  </a:t>
+            </a:r>
           </a:p>
         </p:txBody>
       </p:sp>
@@ -4738,7 +4729,7 @@
           <p:cNvPr id="36" name="Snip Single Corner Rectangle 35">
             <a:extLst>
               <a:ext uri="{FF2B5EF4-FFF2-40B4-BE49-F238E27FC236}">
-                <a16:creationId xmlns:a16="http://schemas.microsoft.com/office/drawing/2014/main" xmlns="" id="{53DB7200-A888-E94D-BC76-5D432CE1D362}"/>
+                <a16:creationId xmlns:a16="http://schemas.microsoft.com/office/drawing/2014/main" id="{53DB7200-A888-E94D-BC76-5D432CE1D362}"/>
               </a:ext>
             </a:extLst>
           </p:cNvPr>
@@ -4790,7 +4781,7 @@
           <p:cNvPr id="38" name="TextBox 37">
             <a:extLst>
               <a:ext uri="{FF2B5EF4-FFF2-40B4-BE49-F238E27FC236}">
-                <a16:creationId xmlns:a16="http://schemas.microsoft.com/office/drawing/2014/main" xmlns="" id="{8FF839AC-EB25-5744-9395-0C9DE6D98C44}"/>
+                <a16:creationId xmlns:a16="http://schemas.microsoft.com/office/drawing/2014/main" id="{8FF839AC-EB25-5744-9395-0C9DE6D98C44}"/>
               </a:ext>
             </a:extLst>
           </p:cNvPr>
@@ -4825,7 +4816,7 @@
           <p:cNvPr id="40" name="Straight Arrow Connector 39">
             <a:extLst>
               <a:ext uri="{FF2B5EF4-FFF2-40B4-BE49-F238E27FC236}">
-                <a16:creationId xmlns:a16="http://schemas.microsoft.com/office/drawing/2014/main" xmlns="" id="{42802C58-1A4A-9D4F-B2DF-15493F4409EB}"/>
+                <a16:creationId xmlns:a16="http://schemas.microsoft.com/office/drawing/2014/main" id="{42802C58-1A4A-9D4F-B2DF-15493F4409EB}"/>
               </a:ext>
             </a:extLst>
           </p:cNvPr>
@@ -4911,10 +4902,9 @@
           <a:lstStyle/>
           <a:p>
             <a:r>
-              <a:rPr lang="en-US" dirty="0" smtClean="0"/>
+              <a:rPr lang="en-US" dirty="0"/>
               <a:t>One Data Model integration</a:t>
             </a:r>
-            <a:endParaRPr lang="en-US" dirty="0"/>
           </a:p>
         </p:txBody>
       </p:sp>
@@ -4939,110 +4929,106 @@
           <a:lstStyle/>
           <a:p>
             <a:r>
-              <a:rPr lang="en-US" dirty="0" smtClean="0"/>
+              <a:rPr lang="en-US" dirty="0"/>
               <a:t>Re-shape One Data Model definitions as </a:t>
             </a:r>
             <a:r>
-              <a:rPr lang="en-US" dirty="0" err="1" smtClean="0"/>
+              <a:rPr lang="en-US" dirty="0" err="1"/>
               <a:t>iotschema</a:t>
             </a:r>
             <a:r>
-              <a:rPr lang="en-US" dirty="0" smtClean="0"/>
+              <a:rPr lang="en-US" dirty="0"/>
               <a:t> definitions</a:t>
             </a:r>
           </a:p>
           <a:p>
             <a:r>
-              <a:rPr lang="en-US" dirty="0" smtClean="0"/>
+              <a:rPr lang="en-US" dirty="0"/>
               <a:t>One Data Model uses JSON object hierarchy vs. RDF links</a:t>
             </a:r>
           </a:p>
           <a:p>
             <a:pPr lvl="1"/>
             <a:r>
-              <a:rPr lang="en-US" dirty="0" smtClean="0"/>
+              <a:rPr lang="en-US" dirty="0"/>
               <a:t>JSON pointer fragment identifiers</a:t>
             </a:r>
           </a:p>
           <a:p>
             <a:pPr lvl="1"/>
             <a:r>
-              <a:rPr lang="en-US" dirty="0" err="1" smtClean="0"/>
+              <a:rPr lang="en-US" dirty="0" err="1"/>
               <a:t>st</a:t>
             </a:r>
             <a:r>
-              <a:rPr lang="en-US" dirty="0" smtClean="0"/>
+              <a:rPr lang="en-US" dirty="0"/>
               <a:t>:#/</a:t>
             </a:r>
             <a:r>
-              <a:rPr lang="en-US" dirty="0" err="1" smtClean="0"/>
+              <a:rPr lang="en-US" dirty="0" err="1"/>
               <a:t>odmObject</a:t>
             </a:r>
             <a:r>
-              <a:rPr lang="en-US" dirty="0" smtClean="0"/>
+              <a:rPr lang="en-US" dirty="0"/>
               <a:t>/</a:t>
             </a:r>
             <a:r>
-              <a:rPr lang="en-US" dirty="0" err="1" smtClean="0"/>
+              <a:rPr lang="en-US" dirty="0" err="1"/>
               <a:t>onoff</a:t>
             </a:r>
             <a:r>
-              <a:rPr lang="en-US" dirty="0" smtClean="0"/>
+              <a:rPr lang="en-US" dirty="0"/>
               <a:t>/</a:t>
             </a:r>
             <a:r>
-              <a:rPr lang="en-US" dirty="0" err="1" smtClean="0"/>
+              <a:rPr lang="en-US" dirty="0" err="1"/>
               <a:t>odmAction</a:t>
             </a:r>
             <a:r>
-              <a:rPr lang="en-US" dirty="0" smtClean="0"/>
+              <a:rPr lang="en-US" dirty="0"/>
               <a:t>/</a:t>
             </a:r>
             <a:r>
-              <a:rPr lang="en-US" dirty="0" err="1" smtClean="0"/>
+              <a:rPr lang="en-US" dirty="0" err="1"/>
               <a:t>turnon</a:t>
             </a:r>
-            <a:endParaRPr lang="en-US" dirty="0" smtClean="0"/>
-          </a:p>
-          <a:p>
-            <a:r>
-              <a:rPr lang="en-US" dirty="0" err="1" smtClean="0"/>
+            <a:endParaRPr lang="en-US" dirty="0"/>
+          </a:p>
+          <a:p>
+            <a:r>
+              <a:rPr lang="en-US" dirty="0" err="1"/>
               <a:t>iot:onoffCapability</a:t>
             </a:r>
             <a:r>
               <a:rPr lang="en-US" dirty="0"/>
-              <a:t> </a:t>
-            </a:r>
-            <a:r>
-              <a:rPr lang="en-US" dirty="0" smtClean="0"/>
-              <a:t>=&gt; </a:t>
-            </a:r>
-            <a:r>
-              <a:rPr lang="en-US" dirty="0" err="1" smtClean="0"/>
+              <a:t> =&gt; </a:t>
+            </a:r>
+            <a:r>
+              <a:rPr lang="en-US" dirty="0" err="1"/>
               <a:t>iot:providesTurnonAction</a:t>
             </a:r>
             <a:r>
-              <a:rPr lang="en-US" dirty="0" smtClean="0"/>
+              <a:rPr lang="en-US" dirty="0"/>
               <a:t> =&gt; </a:t>
             </a:r>
             <a:r>
-              <a:rPr lang="en-US" dirty="0" err="1" smtClean="0"/>
+              <a:rPr lang="en-US" dirty="0" err="1"/>
               <a:t>iot:turnonAction</a:t>
             </a:r>
-            <a:endParaRPr lang="en-US" dirty="0" smtClean="0"/>
+            <a:endParaRPr lang="en-US" dirty="0"/>
           </a:p>
           <a:p>
             <a:pPr lvl="1"/>
             <a:r>
-              <a:rPr lang="en-US" dirty="0" err="1" smtClean="0"/>
+              <a:rPr lang="en-US" dirty="0" err="1"/>
               <a:t>iot:providesTurnonAction</a:t>
             </a:r>
             <a:r>
-              <a:rPr lang="en-US" dirty="0" smtClean="0"/>
+              <a:rPr lang="en-US" dirty="0"/>
               <a:t> is a sub-class property from </a:t>
             </a:r>
             <a:r>
-              <a:rPr lang="en-US" dirty="0" err="1" smtClean="0"/>
+              <a:rPr lang="en-US" dirty="0" err="1"/>
               <a:t>iot:providesInteractionPattern</a:t>
             </a:r>
             <a:endParaRPr lang="en-US" dirty="0"/>
@@ -5095,15 +5081,15 @@
           <a:lstStyle/>
           <a:p>
             <a:r>
-              <a:rPr lang="en-US" dirty="0" err="1" smtClean="0"/>
+              <a:rPr lang="en-US" dirty="0" err="1"/>
               <a:t>iotschema</a:t>
             </a:r>
             <a:r>
-              <a:rPr lang="en-US" dirty="0" smtClean="0"/>
+              <a:rPr lang="en-US" dirty="0"/>
               <a:t> from </a:t>
             </a:r>
             <a:r>
-              <a:rPr lang="en-US" dirty="0" err="1" smtClean="0"/>
+              <a:rPr lang="en-US" dirty="0" err="1"/>
               <a:t>OneDM</a:t>
             </a:r>
             <a:endParaRPr lang="en-US" dirty="0"/>
@@ -5165,120 +5151,119 @@
           </a:p>
           <a:p>
             <a:r>
-              <a:rPr lang="en-US" dirty="0" err="1" smtClean="0"/>
+              <a:rPr lang="en-US" dirty="0" err="1"/>
               <a:t>odmObject</a:t>
             </a:r>
             <a:r>
-              <a:rPr lang="en-US" dirty="0" smtClean="0"/>
+              <a:rPr lang="en-US" dirty="0"/>
               <a:t> is "</a:t>
             </a:r>
             <a:r>
-              <a:rPr lang="en-US" dirty="0" err="1" smtClean="0"/>
+              <a:rPr lang="en-US" dirty="0" err="1"/>
               <a:t>sameAs</a:t>
             </a:r>
             <a:r>
-              <a:rPr lang="en-US" dirty="0" smtClean="0"/>
+              <a:rPr lang="en-US" dirty="0"/>
               <a:t>" </a:t>
             </a:r>
             <a:r>
-              <a:rPr lang="en-US" dirty="0" err="1" smtClean="0"/>
+              <a:rPr lang="en-US" dirty="0" err="1"/>
               <a:t>iotCapability</a:t>
             </a:r>
-            <a:endParaRPr lang="en-US" dirty="0" smtClean="0"/>
-          </a:p>
-          <a:p>
-            <a:r>
-              <a:rPr lang="en-US" dirty="0" smtClean="0"/>
+            <a:endParaRPr lang="en-US" dirty="0"/>
+          </a:p>
+          <a:p>
+            <a:r>
+              <a:rPr lang="en-US" dirty="0"/>
               <a:t>Create type names</a:t>
             </a:r>
           </a:p>
           <a:p>
             <a:pPr lvl="1"/>
             <a:r>
-              <a:rPr lang="en-US" dirty="0" err="1" smtClean="0"/>
+              <a:rPr lang="en-US" dirty="0" err="1"/>
               <a:t>st</a:t>
             </a:r>
             <a:r>
-              <a:rPr lang="en-US" dirty="0" smtClean="0"/>
+              <a:rPr lang="en-US" dirty="0"/>
               <a:t>:#/</a:t>
             </a:r>
             <a:r>
-              <a:rPr lang="en-US" dirty="0" err="1" smtClean="0"/>
+              <a:rPr lang="en-US" dirty="0" err="1"/>
               <a:t>odmObject</a:t>
             </a:r>
             <a:r>
-              <a:rPr lang="en-US" dirty="0" smtClean="0"/>
+              <a:rPr lang="en-US" dirty="0"/>
               <a:t>/switch =&gt; </a:t>
             </a:r>
             <a:r>
-              <a:rPr lang="en-US" dirty="0" err="1" smtClean="0"/>
+              <a:rPr lang="en-US" dirty="0" err="1"/>
               <a:t>iot:switchCapability</a:t>
             </a:r>
-            <a:endParaRPr lang="en-US" dirty="0" smtClean="0"/>
+            <a:endParaRPr lang="en-US" dirty="0"/>
           </a:p>
           <a:p>
             <a:pPr lvl="1"/>
             <a:r>
-              <a:rPr lang="en-US" dirty="0" err="1" smtClean="0"/>
+              <a:rPr lang="en-US" dirty="0" err="1"/>
               <a:t>st</a:t>
             </a:r>
             <a:r>
-              <a:rPr lang="en-US" dirty="0" smtClean="0"/>
+              <a:rPr lang="en-US" dirty="0"/>
               <a:t>:#/</a:t>
             </a:r>
             <a:r>
-              <a:rPr lang="en-US" dirty="0" err="1" smtClean="0"/>
+              <a:rPr lang="en-US" dirty="0" err="1"/>
               <a:t>odmObject</a:t>
             </a:r>
             <a:r>
-              <a:rPr lang="en-US" dirty="0" smtClean="0"/>
+              <a:rPr lang="en-US" dirty="0"/>
               <a:t>/switch/</a:t>
             </a:r>
             <a:r>
-              <a:rPr lang="en-US" dirty="0" err="1" smtClean="0"/>
+              <a:rPr lang="en-US" dirty="0" err="1"/>
               <a:t>odmAction</a:t>
             </a:r>
             <a:r>
-              <a:rPr lang="en-US" dirty="0" smtClean="0"/>
+              <a:rPr lang="en-US" dirty="0"/>
               <a:t>/</a:t>
             </a:r>
             <a:r>
-              <a:rPr lang="en-US" dirty="0" err="1" smtClean="0"/>
+              <a:rPr lang="en-US" dirty="0" err="1"/>
               <a:t>turnon</a:t>
             </a:r>
             <a:r>
-              <a:rPr lang="en-US" dirty="0" smtClean="0"/>
+              <a:rPr lang="en-US" dirty="0"/>
               <a:t> =&gt; </a:t>
             </a:r>
             <a:r>
-              <a:rPr lang="en-US" dirty="0" err="1" smtClean="0"/>
+              <a:rPr lang="en-US" dirty="0" err="1"/>
               <a:t>iot:turnOnAction</a:t>
             </a:r>
             <a:r>
-              <a:rPr lang="en-US" dirty="0" smtClean="0"/>
+              <a:rPr lang="en-US" dirty="0"/>
               <a:t> (</a:t>
             </a:r>
             <a:r>
-              <a:rPr lang="en-US" dirty="0" err="1" smtClean="0"/>
+              <a:rPr lang="en-US" dirty="0" err="1"/>
               <a:t>iot:switchTurnOnAction</a:t>
             </a:r>
             <a:r>
-              <a:rPr lang="en-US" dirty="0" smtClean="0"/>
+              <a:rPr lang="en-US" dirty="0"/>
               <a:t>?)</a:t>
             </a:r>
-            <a:endParaRPr lang="en-US" dirty="0"/>
-          </a:p>
-          <a:p>
-            <a:r>
-              <a:rPr lang="en-US" dirty="0" smtClean="0"/>
+          </a:p>
+          <a:p>
+            <a:r>
+              <a:rPr lang="en-US" dirty="0"/>
               <a:t>Synthesize the </a:t>
             </a:r>
             <a:r>
-              <a:rPr lang="en-US" dirty="0" err="1" smtClean="0"/>
+              <a:rPr lang="en-US" dirty="0" err="1"/>
               <a:t>schema.org</a:t>
             </a:r>
             <a:r>
-              <a:rPr lang="en-US" dirty="0" smtClean="0"/>
+              <a:rPr lang="en-US" dirty="0"/>
               <a:t> style property types</a:t>
             </a:r>
           </a:p>
@@ -5286,21 +5271,17 @@
             <a:pPr lvl="1"/>
             <a:r>
               <a:rPr lang="en-US" dirty="0" err="1"/>
-              <a:t>p</a:t>
-            </a:r>
-            <a:r>
-              <a:rPr lang="en-US" dirty="0" err="1" smtClean="0"/>
-              <a:t>rovidesInteractionPattern</a:t>
-            </a:r>
-            <a:r>
-              <a:rPr lang="en-US" dirty="0" smtClean="0"/>
+              <a:t>providesInteractionPattern</a:t>
+            </a:r>
+            <a:r>
+              <a:rPr lang="en-US" dirty="0"/>
               <a:t> subtypes</a:t>
             </a:r>
           </a:p>
           <a:p>
             <a:pPr lvl="1"/>
             <a:r>
-              <a:rPr lang="en-US" i="1" dirty="0" err="1" smtClean="0"/>
+              <a:rPr lang="en-US" i="1" dirty="0" err="1"/>
               <a:t>providesSwitchTurnOnAction</a:t>
             </a:r>
             <a:endParaRPr lang="en-US" i="1" dirty="0"/>
@@ -5356,39 +5337,74 @@
           <a:lstStyle/>
           <a:p>
             <a:r>
-              <a:rPr lang="en-US" dirty="0" smtClean="0"/>
+              <a:rPr lang="en-US" dirty="0"/>
               <a:t>Path Construct in RDF </a:t>
             </a:r>
+          </a:p>
+        </p:txBody>
+      </p:sp>
+      <p:sp>
+        <p:nvSpPr>
+          <p:cNvPr id="3" name="Content Placeholder 2"/>
+          <p:cNvSpPr>
+            <a:spLocks noGrp="1"/>
+          </p:cNvSpPr>
+          <p:nvPr>
+            <p:ph idx="1"/>
+          </p:nvPr>
+        </p:nvSpPr>
+        <p:spPr/>
+        <p:txBody>
+          <a:bodyPr/>
+          <a:lstStyle/>
+          <a:p>
+            <a:r>
+              <a:rPr lang="en-US" dirty="0" err="1"/>
+              <a:t>st</a:t>
+            </a:r>
+            <a:r>
+              <a:rPr lang="en-US" dirty="0"/>
+              <a:t>:#/</a:t>
+            </a:r>
+            <a:r>
+              <a:rPr lang="en-US" dirty="0" err="1"/>
+              <a:t>odmObject</a:t>
+            </a:r>
+            <a:r>
+              <a:rPr lang="en-US" dirty="0"/>
+              <a:t>/</a:t>
+            </a:r>
+            <a:r>
+              <a:rPr lang="en-US" dirty="0" err="1"/>
+              <a:t>onoff</a:t>
+            </a:r>
+            <a:r>
+              <a:rPr lang="en-US" dirty="0"/>
+              <a:t>/</a:t>
+            </a:r>
+            <a:r>
+              <a:rPr lang="en-US" dirty="0" err="1"/>
+              <a:t>odmAction</a:t>
+            </a:r>
+            <a:r>
+              <a:rPr lang="en-US" dirty="0"/>
+              <a:t>/</a:t>
+            </a:r>
+            <a:r>
+              <a:rPr lang="en-US" dirty="0" err="1"/>
+              <a:t>turnon</a:t>
+            </a:r>
             <a:endParaRPr lang="en-US" dirty="0"/>
           </a:p>
-        </p:txBody>
-      </p:sp>
-      <p:sp>
-        <p:nvSpPr>
-          <p:cNvPr id="3" name="Content Placeholder 2"/>
-          <p:cNvSpPr>
-            <a:spLocks noGrp="1"/>
-          </p:cNvSpPr>
-          <p:nvPr>
-            <p:ph idx="1"/>
-          </p:nvPr>
-        </p:nvSpPr>
-        <p:spPr/>
-        <p:txBody>
-          <a:bodyPr/>
-          <a:lstStyle/>
-          <a:p>
-            <a:r>
-              <a:rPr lang="en-US" dirty="0" err="1"/>
-              <a:t>st</a:t>
-            </a:r>
-            <a:r>
-              <a:rPr lang="en-US" dirty="0"/>
-              <a:t>:#/</a:t>
-            </a:r>
-            <a:r>
-              <a:rPr lang="en-US" dirty="0" err="1"/>
-              <a:t>odmObject</a:t>
+          <a:p>
+            <a:pPr lvl="1"/>
+            <a:r>
+              <a:rPr lang="en-US" dirty="0"/>
+              <a:t>"@id": "</a:t>
+            </a:r>
+            <a:r>
+              <a:rPr lang="en-US" dirty="0" err="1"/>
+              <a:t>iot:iotCapability</a:t>
             </a:r>
             <a:r>
               <a:rPr lang="en-US" dirty="0"/>
@@ -5400,11 +5416,26 @@
             </a:r>
             <a:r>
               <a:rPr lang="en-US" dirty="0"/>
+              <a:t>"</a:t>
+            </a:r>
+          </a:p>
+          <a:p>
+            <a:pPr lvl="1"/>
+            <a:r>
+              <a:rPr lang="en-US" dirty="0"/>
+              <a:t>"@id": "</a:t>
+            </a:r>
+            <a:r>
+              <a:rPr lang="en-US" dirty="0" err="1"/>
+              <a:t>iot:iotCapability</a:t>
+            </a:r>
+            <a:r>
+              <a:rPr lang="en-US" dirty="0"/>
               <a:t>/</a:t>
             </a:r>
             <a:r>
               <a:rPr lang="en-US" dirty="0" err="1"/>
-              <a:t>odmAction</a:t>
+              <a:t>onoff</a:t>
             </a:r>
             <a:r>
               <a:rPr lang="en-US" dirty="0"/>
@@ -5412,50 +5443,64 @@
             </a:r>
             <a:r>
               <a:rPr lang="en-US" dirty="0" err="1"/>
+              <a:t>iotAction</a:t>
+            </a:r>
+            <a:r>
+              <a:rPr lang="en-US" dirty="0"/>
+              <a:t>/</a:t>
+            </a:r>
+            <a:r>
+              <a:rPr lang="en-US" dirty="0" err="1"/>
               <a:t>turnon</a:t>
             </a:r>
+            <a:r>
+              <a:rPr lang="en-US" dirty="0"/>
+              <a:t>"</a:t>
+            </a:r>
+          </a:p>
+          <a:p>
+            <a:r>
+              <a:rPr lang="en-US" dirty="0"/>
+              <a:t>What does the property type look like?</a:t>
+            </a:r>
+          </a:p>
+          <a:p>
+            <a:pPr lvl="1"/>
+            <a:r>
+              <a:rPr lang="en-US" dirty="0" err="1"/>
+              <a:t>iot:providesInteractionPattern</a:t>
+            </a:r>
             <a:endParaRPr lang="en-US" dirty="0"/>
           </a:p>
           <a:p>
             <a:pPr lvl="1"/>
             <a:r>
-              <a:rPr lang="en-US" dirty="0" smtClean="0"/>
-              <a:t>"@id": "</a:t>
-            </a:r>
-            <a:r>
-              <a:rPr lang="en-US" dirty="0" err="1" smtClean="0"/>
-              <a:t>iot:iotCapability</a:t>
-            </a:r>
-            <a:r>
-              <a:rPr lang="en-US" dirty="0" smtClean="0"/>
+              <a:rPr lang="en-US" dirty="0" err="1"/>
+              <a:t>iot:providesTurnonAction</a:t>
+            </a:r>
+            <a:endParaRPr lang="en-US" dirty="0"/>
+          </a:p>
+          <a:p>
+            <a:pPr lvl="1"/>
+            <a:r>
+              <a:rPr lang="en-US" dirty="0" err="1"/>
+              <a:t>iot:providesiotCapability</a:t>
+            </a:r>
+            <a:r>
+              <a:rPr lang="en-US" dirty="0"/>
               <a:t>/</a:t>
             </a:r>
             <a:r>
-              <a:rPr lang="en-US" dirty="0" err="1" smtClean="0"/>
+              <a:rPr lang="en-US" dirty="0" err="1"/>
               <a:t>onoff</a:t>
             </a:r>
             <a:r>
-              <a:rPr lang="en-US" dirty="0" smtClean="0"/>
-              <a:t>"</a:t>
-            </a:r>
-          </a:p>
-          <a:p>
-            <a:pPr lvl="1"/>
-            <a:r>
-              <a:rPr lang="en-US" dirty="0"/>
-              <a:t>"@id": "</a:t>
-            </a:r>
-            <a:r>
-              <a:rPr lang="en-US" dirty="0" err="1"/>
-              <a:t>iot:iotCapability</a:t>
-            </a:r>
-            <a:r>
               <a:rPr lang="en-US" dirty="0"/>
               <a:t>/</a:t>
             </a:r>
             <a:r>
               <a:rPr lang="en-US" dirty="0" err="1"/>
-              <a:t>onoff</a:t>
+              <a:t>iotAction</a:t>
             </a:r>
             <a:r>
               <a:rPr lang="en-US" dirty="0"/>
@@ -5463,71 +5508,6 @@
             </a:r>
             <a:r>
               <a:rPr lang="en-US" dirty="0" err="1"/>
-              <a:t>iotAction</a:t>
-            </a:r>
-            <a:r>
-              <a:rPr lang="en-US" dirty="0"/>
-              <a:t>/</a:t>
-            </a:r>
-            <a:r>
-              <a:rPr lang="en-US" dirty="0" err="1"/>
-              <a:t>turnon</a:t>
-            </a:r>
-            <a:r>
-              <a:rPr lang="en-US" dirty="0"/>
-              <a:t>"</a:t>
-            </a:r>
-          </a:p>
-          <a:p>
-            <a:r>
-              <a:rPr lang="en-US" dirty="0" smtClean="0"/>
-              <a:t>What does the property type look like?</a:t>
-            </a:r>
-          </a:p>
-          <a:p>
-            <a:pPr lvl="1"/>
-            <a:r>
-              <a:rPr lang="en-US" dirty="0" err="1" smtClean="0"/>
-              <a:t>iot:providesInteractionPattern</a:t>
-            </a:r>
-            <a:endParaRPr lang="en-US" dirty="0" smtClean="0"/>
-          </a:p>
-          <a:p>
-            <a:pPr lvl="1"/>
-            <a:r>
-              <a:rPr lang="en-US" dirty="0" err="1" smtClean="0"/>
-              <a:t>iot:providesTurnonAction</a:t>
-            </a:r>
-            <a:endParaRPr lang="en-US" dirty="0" smtClean="0"/>
-          </a:p>
-          <a:p>
-            <a:pPr lvl="1"/>
-            <a:r>
-              <a:rPr lang="en-US" dirty="0" err="1" smtClean="0"/>
-              <a:t>iot:providesiotCapability</a:t>
-            </a:r>
-            <a:r>
-              <a:rPr lang="en-US" dirty="0" smtClean="0"/>
-              <a:t>/</a:t>
-            </a:r>
-            <a:r>
-              <a:rPr lang="en-US" dirty="0" err="1" smtClean="0"/>
-              <a:t>onoff</a:t>
-            </a:r>
-            <a:r>
-              <a:rPr lang="en-US" dirty="0" smtClean="0"/>
-              <a:t>/</a:t>
-            </a:r>
-            <a:r>
-              <a:rPr lang="en-US" dirty="0" err="1" smtClean="0"/>
-              <a:t>iotAction</a:t>
-            </a:r>
-            <a:r>
-              <a:rPr lang="en-US" dirty="0" smtClean="0"/>
-              <a:t>/</a:t>
-            </a:r>
-            <a:r>
-              <a:rPr lang="en-US" dirty="0" err="1" smtClean="0"/>
               <a:t>turnon</a:t>
             </a:r>
             <a:endParaRPr lang="en-US" dirty="0"/>
@@ -5954,11 +5934,7 @@
           <a:p>
             <a:r>
               <a:rPr lang="en-US" dirty="0"/>
-              <a:t>Likewise, </a:t>
-            </a:r>
-            <a:r>
-              <a:rPr lang="en-US" dirty="0" smtClean="0"/>
-              <a:t>an </a:t>
+              <a:t>Likewise, an </a:t>
             </a:r>
             <a:r>
               <a:rPr lang="en-US" dirty="0" err="1"/>
@@ -5966,15 +5942,7 @@
             </a:r>
             <a:r>
               <a:rPr lang="en-US" dirty="0"/>
-              <a:t> Schema </a:t>
-            </a:r>
-            <a:r>
-              <a:rPr lang="en-US" dirty="0"/>
-              <a:t>instance would </a:t>
-            </a:r>
-            <a:r>
-              <a:rPr lang="en-US" dirty="0"/>
-              <a:t>contain some set of </a:t>
+              <a:t> Schema instance would contain some set of </a:t>
             </a:r>
             <a:r>
               <a:rPr lang="en-US" dirty="0" err="1"/>
@@ -6220,47 +6188,36 @@
           <a:p>
             <a:r>
               <a:rPr lang="en-US" dirty="0"/>
-              <a:t>Announcements </a:t>
-            </a:r>
-            <a:r>
-              <a:rPr lang="en-US" dirty="0" smtClean="0"/>
-              <a:t> and industry developments </a:t>
-            </a:r>
-          </a:p>
-          <a:p>
-            <a:r>
-              <a:rPr lang="en-US" dirty="0" smtClean="0"/>
+              <a:t>Announcements  and industry developments </a:t>
+            </a:r>
+          </a:p>
+          <a:p>
+            <a:r>
+              <a:rPr lang="en-US" dirty="0"/>
               <a:t>New Capability review</a:t>
             </a:r>
-            <a:endParaRPr lang="en-US" dirty="0"/>
-          </a:p>
-          <a:p>
-            <a:r>
-              <a:rPr lang="en-US" dirty="0" smtClean="0"/>
+          </a:p>
+          <a:p>
+            <a:r>
+              <a:rPr lang="en-US" dirty="0"/>
               <a:t>Thing class</a:t>
             </a:r>
           </a:p>
           <a:p>
             <a:r>
-              <a:rPr lang="en-US" dirty="0" smtClean="0"/>
+              <a:rPr lang="en-US" dirty="0"/>
               <a:t>One Data Model integration/format conversion</a:t>
             </a:r>
-            <a:endParaRPr lang="en-US" dirty="0"/>
-          </a:p>
-          <a:p>
-            <a:r>
-              <a:rPr lang="en-US" dirty="0" err="1" smtClean="0"/>
+          </a:p>
+          <a:p>
+            <a:r>
+              <a:rPr lang="en-US" dirty="0" err="1"/>
               <a:t>schema.org</a:t>
             </a:r>
             <a:r>
               <a:rPr lang="en-US" dirty="0"/>
-              <a:t> </a:t>
-            </a:r>
-            <a:r>
-              <a:rPr lang="en-US" dirty="0" smtClean="0"/>
-              <a:t>integration patterns</a:t>
-            </a:r>
-            <a:endParaRPr lang="en-US" dirty="0"/>
+              <a:t> integration patterns</a:t>
+            </a:r>
           </a:p>
           <a:p>
             <a:r>
@@ -6344,7 +6301,9 @@
           </a:xfrm>
         </p:spPr>
         <p:txBody>
-          <a:bodyPr/>
+          <a:bodyPr>
+            <a:normAutofit lnSpcReduction="10000"/>
+          </a:bodyPr>
           <a:lstStyle/>
           <a:p>
             <a:r>
@@ -6353,145 +6312,115 @@
             </a:r>
             <a:r>
               <a:rPr lang="en-US" dirty="0"/>
-              <a:t> online conference in </a:t>
-            </a:r>
-            <a:r>
-              <a:rPr lang="en-US" dirty="0" smtClean="0"/>
-              <a:t>progress</a:t>
+              <a:t> online conference in progress</a:t>
             </a:r>
           </a:p>
           <a:p>
             <a:pPr lvl="1"/>
             <a:r>
-              <a:rPr lang="en-US" dirty="0" smtClean="0"/>
+              <a:rPr lang="en-US" dirty="0"/>
               <a:t>Driving to public engagement 6/2020</a:t>
             </a:r>
           </a:p>
           <a:p>
             <a:pPr lvl="1"/>
             <a:r>
-              <a:rPr lang="en-US" dirty="0" smtClean="0"/>
+              <a:rPr lang="en-US" dirty="0"/>
               <a:t>All participants have agreed on the BSD license</a:t>
             </a:r>
+          </a:p>
+          <a:p>
+            <a:r>
+              <a:rPr lang="en-US" dirty="0"/>
+              <a:t>WISHI Workshops and Hackathon</a:t>
+            </a:r>
+          </a:p>
+          <a:p>
+            <a:pPr lvl="1"/>
+            <a:r>
+              <a:rPr lang="en-US" dirty="0"/>
+              <a:t>Semantic Proxy using W3C </a:t>
+            </a:r>
+            <a:r>
+              <a:rPr lang="en-US" dirty="0" err="1"/>
+              <a:t>WoT</a:t>
+            </a:r>
+            <a:r>
+              <a:rPr lang="en-US" dirty="0"/>
+              <a:t> with RDF annotation based on </a:t>
+            </a:r>
+            <a:r>
+              <a:rPr lang="en-US" dirty="0" err="1"/>
+              <a:t>OneDM</a:t>
+            </a:r>
+            <a:r>
+              <a:rPr lang="en-US" dirty="0"/>
+              <a:t> definitions</a:t>
+            </a:r>
+          </a:p>
+          <a:p>
+            <a:r>
+              <a:rPr lang="en-US" dirty="0"/>
+              <a:t>W3C </a:t>
+            </a:r>
+            <a:r>
+              <a:rPr lang="en-US" dirty="0" err="1"/>
+              <a:t>WoT</a:t>
+            </a:r>
+            <a:r>
+              <a:rPr lang="en-US" dirty="0"/>
+              <a:t> Online Virtual F2F mid-late-June</a:t>
+            </a:r>
+          </a:p>
+          <a:p>
+            <a:pPr lvl="1"/>
+            <a:r>
+              <a:rPr lang="en-US" dirty="0"/>
+              <a:t>Focus on directory integration, discovery, semantics</a:t>
+            </a:r>
+          </a:p>
+          <a:p>
+            <a:r>
+              <a:rPr lang="en-US" dirty="0" err="1"/>
+              <a:t>Zigbee</a:t>
+            </a:r>
+            <a:r>
+              <a:rPr lang="en-US" dirty="0"/>
+              <a:t> CHIP project for </a:t>
+            </a:r>
+            <a:r>
+              <a:rPr lang="en-US" dirty="0" err="1"/>
+              <a:t>IoT</a:t>
+            </a:r>
+            <a:r>
+              <a:rPr lang="en-US" dirty="0"/>
+              <a:t> </a:t>
+            </a:r>
+            <a:r>
+              <a:rPr lang="en-US" dirty="0" err="1"/>
+              <a:t>interoperabiity</a:t>
+            </a:r>
             <a:endParaRPr lang="en-US" dirty="0"/>
           </a:p>
           <a:p>
-            <a:r>
-              <a:rPr lang="en-US" dirty="0" smtClean="0"/>
-              <a:t>WISHI Workshops and Hackathon</a:t>
-            </a:r>
-            <a:endParaRPr lang="en-US" dirty="0"/>
-          </a:p>
-          <a:p>
             <a:pPr lvl="1"/>
             <a:r>
               <a:rPr lang="en-US" dirty="0"/>
-              <a:t>Semantic Proxy using W3C </a:t>
-            </a:r>
-            <a:r>
-              <a:rPr lang="en-US" dirty="0" err="1"/>
-              <a:t>WoT</a:t>
-            </a:r>
-            <a:r>
-              <a:rPr lang="en-US" dirty="0"/>
-              <a:t> </a:t>
-            </a:r>
-            <a:r>
-              <a:rPr lang="en-US" dirty="0" smtClean="0"/>
-              <a:t>with </a:t>
-            </a:r>
-            <a:r>
-              <a:rPr lang="en-US" dirty="0" smtClean="0"/>
-              <a:t>RDF</a:t>
-            </a:r>
-            <a:r>
-              <a:rPr lang="en-US" dirty="0" smtClean="0"/>
-              <a:t> </a:t>
-            </a:r>
-            <a:r>
-              <a:rPr lang="en-US" dirty="0"/>
-              <a:t>annotation </a:t>
-            </a:r>
-            <a:r>
-              <a:rPr lang="en-US" dirty="0" smtClean="0"/>
-              <a:t>based on </a:t>
-            </a:r>
-            <a:r>
-              <a:rPr lang="en-US" dirty="0" err="1" smtClean="0"/>
-              <a:t>OneDM</a:t>
-            </a:r>
-            <a:r>
-              <a:rPr lang="en-US" dirty="0" smtClean="0"/>
-              <a:t> definitions</a:t>
-            </a:r>
-          </a:p>
-          <a:p>
-            <a:r>
-              <a:rPr lang="en-US" dirty="0"/>
-              <a:t>W3C </a:t>
-            </a:r>
-            <a:r>
-              <a:rPr lang="en-US" dirty="0" err="1"/>
-              <a:t>WoT</a:t>
-            </a:r>
-            <a:r>
-              <a:rPr lang="en-US" dirty="0"/>
-              <a:t> Online Virtual F2F </a:t>
-            </a:r>
-            <a:r>
-              <a:rPr lang="en-US" dirty="0" smtClean="0"/>
-              <a:t>mid-late-June</a:t>
+              <a:t>Open source stack and data models</a:t>
             </a:r>
           </a:p>
           <a:p>
             <a:pPr lvl="1"/>
             <a:r>
-              <a:rPr lang="en-US" dirty="0" smtClean="0"/>
-              <a:t>Focus on directory integration, discovery, semantics</a:t>
-            </a:r>
-          </a:p>
-          <a:p>
-            <a:r>
-              <a:rPr lang="en-US" dirty="0" err="1" smtClean="0"/>
+              <a:rPr lang="en-US" dirty="0" err="1"/>
               <a:t>Zigbee</a:t>
             </a:r>
             <a:r>
-              <a:rPr lang="en-US" dirty="0" smtClean="0"/>
-              <a:t> CHIP project for </a:t>
-            </a:r>
-            <a:r>
-              <a:rPr lang="en-US" dirty="0" err="1" smtClean="0"/>
-              <a:t>IoT</a:t>
-            </a:r>
-            <a:r>
-              <a:rPr lang="en-US" dirty="0" smtClean="0"/>
-              <a:t> </a:t>
-            </a:r>
-            <a:r>
-              <a:rPr lang="en-US" dirty="0" err="1" smtClean="0"/>
-              <a:t>interoperabiity</a:t>
-            </a:r>
-            <a:endParaRPr lang="en-US" dirty="0" smtClean="0"/>
-          </a:p>
-          <a:p>
-            <a:pPr lvl="1"/>
-            <a:r>
-              <a:rPr lang="en-US" dirty="0" smtClean="0"/>
-              <a:t>Open source stack and data models</a:t>
-            </a:r>
-          </a:p>
-          <a:p>
-            <a:pPr lvl="1"/>
-            <a:r>
-              <a:rPr lang="en-US" dirty="0" err="1" smtClean="0"/>
-              <a:t>Zigbee</a:t>
-            </a:r>
-            <a:r>
-              <a:rPr lang="en-US" dirty="0" smtClean="0"/>
+              <a:rPr lang="en-US" dirty="0"/>
               <a:t>/CHIP models can be published on </a:t>
             </a:r>
             <a:r>
-              <a:rPr lang="en-US" dirty="0" err="1" smtClean="0"/>
+              <a:rPr lang="en-US" dirty="0" err="1"/>
               <a:t>OneDM</a:t>
             </a:r>
             <a:endParaRPr lang="en-US" dirty="0"/>
@@ -6620,16 +6549,12 @@
               <a:t> </a:t>
             </a:r>
             <a:r>
-              <a:rPr lang="mr-IN" dirty="0" smtClean="0"/>
+              <a:rPr lang="mr-IN" dirty="0"/>
               <a:t>–</a:t>
             </a:r>
             <a:r>
-              <a:rPr lang="en-US" dirty="0" smtClean="0"/>
-              <a:t> unified data </a:t>
-            </a:r>
-            <a:r>
-              <a:rPr lang="en-US" dirty="0"/>
-              <a:t>models for connected home devices + Event, Action, Property model + open source license</a:t>
+              <a:rPr lang="en-US" dirty="0"/>
+              <a:t> unified data models for connected home devices + Event, Action, Property model + open source license</a:t>
             </a:r>
           </a:p>
           <a:p>
@@ -6686,10 +6611,9 @@
           <a:lstStyle/>
           <a:p>
             <a:r>
-              <a:rPr lang="en-US" dirty="0" smtClean="0"/>
+              <a:rPr lang="en-US" dirty="0"/>
               <a:t>Capability Proposal</a:t>
             </a:r>
-            <a:endParaRPr lang="en-US" dirty="0"/>
           </a:p>
         </p:txBody>
       </p:sp>
@@ -6709,10 +6633,9 @@
           <a:lstStyle/>
           <a:p>
             <a:r>
-              <a:rPr lang="en-US" dirty="0" smtClean="0"/>
+              <a:rPr lang="en-US" dirty="0"/>
               <a:t>New Capability Review</a:t>
             </a:r>
-            <a:endParaRPr lang="en-US" dirty="0"/>
           </a:p>
         </p:txBody>
       </p:sp>
@@ -7214,1456 +7137,79 @@
           <a:chExt cx="0" cy="0"/>
         </a:xfrm>
       </p:grpSpPr>
-      <p:sp>
-        <p:nvSpPr>
-          <p:cNvPr id="2" name="Title 1"/>
-          <p:cNvSpPr>
-            <a:spLocks noGrp="1"/>
-          </p:cNvSpPr>
-          <p:nvPr>
-            <p:ph type="title"/>
-          </p:nvPr>
-        </p:nvSpPr>
+      <p:pic>
+        <p:nvPicPr>
+          <p:cNvPr id="3" name="Picture 2"/>
+          <p:cNvPicPr>
+            <a:picLocks noChangeAspect="1"/>
+          </p:cNvPicPr>
+          <p:nvPr/>
+        </p:nvPicPr>
+        <p:blipFill>
+          <a:blip r:embed="rId2">
+            <a:extLst>
+              <a:ext uri="{28A0092B-C50C-407E-A947-70E740481C1C}">
+                <a14:useLocalDpi xmlns:a14="http://schemas.microsoft.com/office/drawing/2010/main" val="0"/>
+              </a:ext>
+            </a:extLst>
+          </a:blip>
+          <a:stretch>
+            <a:fillRect/>
+          </a:stretch>
+        </p:blipFill>
         <p:spPr>
           <a:xfrm>
-            <a:off x="559342" y="284843"/>
-            <a:ext cx="7886700" cy="1325563"/>
-          </a:xfrm>
-        </p:spPr>
-        <p:txBody>
-          <a:bodyPr/>
-          <a:lstStyle/>
-          <a:p>
-            <a:r>
-              <a:rPr lang="en-US" dirty="0" err="1"/>
-              <a:t>schema.org</a:t>
-            </a:r>
-            <a:r>
-              <a:rPr lang="en-US" dirty="0"/>
-              <a:t> </a:t>
-            </a:r>
-            <a:r>
-              <a:rPr lang="en-US" dirty="0" err="1"/>
-              <a:t>IoT</a:t>
-            </a:r>
-            <a:r>
-              <a:rPr lang="en-US" dirty="0"/>
-              <a:t> Extension</a:t>
-            </a:r>
-            <a:br>
-              <a:rPr lang="en-US" dirty="0"/>
-            </a:br>
-            <a:r>
-              <a:rPr lang="en-US" dirty="0"/>
-              <a:t>Meta Model with Thing Class</a:t>
-            </a:r>
-          </a:p>
-        </p:txBody>
-      </p:sp>
-      <p:sp>
-        <p:nvSpPr>
-          <p:cNvPr id="4" name="Rectangle 3"/>
-          <p:cNvSpPr/>
-          <p:nvPr/>
-        </p:nvSpPr>
-        <p:spPr>
-          <a:xfrm>
-            <a:off x="3267393" y="2015406"/>
-            <a:ext cx="1705551" cy="303427"/>
+            <a:off x="1509264" y="1381990"/>
+            <a:ext cx="6981591" cy="4841009"/>
           </a:xfrm>
           <a:prstGeom prst="rect">
             <a:avLst/>
           </a:prstGeom>
-          <a:noFill/>
-          <a:ln>
-            <a:solidFill>
-              <a:schemeClr val="tx1"/>
-            </a:solidFill>
-          </a:ln>
-        </p:spPr>
-        <p:style>
-          <a:lnRef idx="1">
-            <a:schemeClr val="accent1"/>
-          </a:lnRef>
-          <a:fillRef idx="3">
-            <a:schemeClr val="accent1"/>
-          </a:fillRef>
-          <a:effectRef idx="2">
-            <a:schemeClr val="accent1"/>
-          </a:effectRef>
-          <a:fontRef idx="minor">
-            <a:schemeClr val="lt1"/>
-          </a:fontRef>
-        </p:style>
-        <p:txBody>
-          <a:bodyPr rtlCol="0" anchor="ctr"/>
-          <a:lstStyle/>
-          <a:p>
-            <a:pPr algn="ctr"/>
-            <a:r>
-              <a:rPr lang="en-US" sz="1600" dirty="0" err="1">
-                <a:solidFill>
-                  <a:schemeClr val="tx1"/>
-                </a:solidFill>
-              </a:rPr>
-              <a:t>schema:thing</a:t>
-            </a:r>
-            <a:endParaRPr lang="en-US" sz="1600" dirty="0">
-              <a:solidFill>
-                <a:schemeClr val="tx1"/>
-              </a:solidFill>
-            </a:endParaRPr>
-          </a:p>
-        </p:txBody>
-      </p:sp>
-      <p:sp>
-        <p:nvSpPr>
-          <p:cNvPr id="5" name="Rectangle 4"/>
-          <p:cNvSpPr/>
-          <p:nvPr/>
+        </p:spPr>
+      </p:pic>
+      <p:sp>
+        <p:nvSpPr>
+          <p:cNvPr id="2" name="Title 1"/>
+          <p:cNvSpPr>
+            <a:spLocks noGrp="1"/>
+          </p:cNvSpPr>
+          <p:nvPr>
+            <p:ph type="title"/>
+          </p:nvPr>
         </p:nvSpPr>
         <p:spPr>
           <a:xfrm>
-            <a:off x="1002119" y="2912962"/>
-            <a:ext cx="1705551" cy="303427"/>
-          </a:xfrm>
-          <a:prstGeom prst="rect">
-            <a:avLst/>
-          </a:prstGeom>
-          <a:solidFill>
-            <a:schemeClr val="tx2">
-              <a:lumMod val="40000"/>
-              <a:lumOff val="60000"/>
-            </a:schemeClr>
-          </a:solidFill>
-          <a:ln>
-            <a:solidFill>
-              <a:schemeClr val="tx1"/>
-            </a:solidFill>
-          </a:ln>
-        </p:spPr>
-        <p:style>
-          <a:lnRef idx="1">
-            <a:schemeClr val="accent1"/>
-          </a:lnRef>
-          <a:fillRef idx="3">
-            <a:schemeClr val="accent1"/>
-          </a:fillRef>
-          <a:effectRef idx="2">
-            <a:schemeClr val="accent1"/>
-          </a:effectRef>
-          <a:fontRef idx="minor">
-            <a:schemeClr val="lt1"/>
-          </a:fontRef>
-        </p:style>
-        <p:txBody>
-          <a:bodyPr rtlCol="0" anchor="ctr"/>
-          <a:lstStyle/>
-          <a:p>
-            <a:pPr algn="ctr"/>
-            <a:r>
-              <a:rPr lang="en-US" sz="1600" dirty="0" err="1">
-                <a:solidFill>
-                  <a:schemeClr val="tx1"/>
-                </a:solidFill>
-              </a:rPr>
-              <a:t>IotCapability</a:t>
-            </a:r>
-            <a:endParaRPr lang="en-US" sz="1600" dirty="0">
-              <a:solidFill>
-                <a:schemeClr val="tx1"/>
-              </a:solidFill>
-            </a:endParaRPr>
-          </a:p>
-        </p:txBody>
-      </p:sp>
-      <p:sp>
-        <p:nvSpPr>
-          <p:cNvPr id="6" name="Rectangle 5"/>
-          <p:cNvSpPr/>
-          <p:nvPr/>
-        </p:nvSpPr>
-        <p:spPr>
-          <a:xfrm>
-            <a:off x="3811760" y="2912962"/>
-            <a:ext cx="1705551" cy="303427"/>
-          </a:xfrm>
-          <a:prstGeom prst="rect">
-            <a:avLst/>
-          </a:prstGeom>
-          <a:solidFill>
-            <a:schemeClr val="tx2">
-              <a:lumMod val="40000"/>
-              <a:lumOff val="60000"/>
-            </a:schemeClr>
-          </a:solidFill>
-          <a:ln>
-            <a:solidFill>
-              <a:schemeClr val="tx1"/>
-            </a:solidFill>
-          </a:ln>
-        </p:spPr>
-        <p:style>
-          <a:lnRef idx="1">
-            <a:schemeClr val="accent1"/>
-          </a:lnRef>
-          <a:fillRef idx="3">
-            <a:schemeClr val="accent1"/>
-          </a:fillRef>
-          <a:effectRef idx="2">
-            <a:schemeClr val="accent1"/>
-          </a:effectRef>
-          <a:fontRef idx="minor">
-            <a:schemeClr val="lt1"/>
-          </a:fontRef>
-        </p:style>
-        <p:txBody>
-          <a:bodyPr rtlCol="0" anchor="ctr"/>
-          <a:lstStyle/>
-          <a:p>
-            <a:pPr algn="ctr"/>
-            <a:r>
-              <a:rPr lang="en-US" sz="1600" dirty="0" err="1">
-                <a:solidFill>
-                  <a:schemeClr val="tx1"/>
-                </a:solidFill>
-              </a:rPr>
-              <a:t>InteractionPattern</a:t>
-            </a:r>
-            <a:endParaRPr lang="en-US" sz="1600" dirty="0">
-              <a:solidFill>
-                <a:schemeClr val="tx1"/>
-              </a:solidFill>
-            </a:endParaRPr>
-          </a:p>
-        </p:txBody>
-      </p:sp>
-      <p:sp>
-        <p:nvSpPr>
-          <p:cNvPr id="7" name="Rectangle 6"/>
-          <p:cNvSpPr/>
-          <p:nvPr/>
-        </p:nvSpPr>
-        <p:spPr>
-          <a:xfrm>
-            <a:off x="2946225" y="3661546"/>
-            <a:ext cx="1060597" cy="303427"/>
-          </a:xfrm>
-          <a:prstGeom prst="rect">
-            <a:avLst/>
-          </a:prstGeom>
-          <a:solidFill>
-            <a:schemeClr val="tx2">
-              <a:lumMod val="40000"/>
-              <a:lumOff val="60000"/>
-            </a:schemeClr>
-          </a:solidFill>
-          <a:ln>
-            <a:solidFill>
-              <a:schemeClr val="tx1"/>
-            </a:solidFill>
-          </a:ln>
-        </p:spPr>
-        <p:style>
-          <a:lnRef idx="1">
-            <a:schemeClr val="accent1"/>
-          </a:lnRef>
-          <a:fillRef idx="3">
-            <a:schemeClr val="accent1"/>
-          </a:fillRef>
-          <a:effectRef idx="2">
-            <a:schemeClr val="accent1"/>
-          </a:effectRef>
-          <a:fontRef idx="minor">
-            <a:schemeClr val="lt1"/>
-          </a:fontRef>
-        </p:style>
-        <p:txBody>
-          <a:bodyPr rtlCol="0" anchor="ctr"/>
-          <a:lstStyle/>
-          <a:p>
-            <a:pPr algn="ctr"/>
-            <a:r>
-              <a:rPr lang="en-US" sz="1600">
-                <a:solidFill>
-                  <a:schemeClr val="tx1"/>
-                </a:solidFill>
-              </a:rPr>
-              <a:t>IotAction</a:t>
-            </a:r>
-            <a:endParaRPr lang="en-US" sz="1600" dirty="0">
-              <a:solidFill>
-                <a:schemeClr val="tx1"/>
-              </a:solidFill>
-            </a:endParaRPr>
-          </a:p>
-        </p:txBody>
-      </p:sp>
-      <p:sp>
-        <p:nvSpPr>
-          <p:cNvPr id="8" name="Rectangle 7"/>
-          <p:cNvSpPr/>
-          <p:nvPr/>
-        </p:nvSpPr>
-        <p:spPr>
-          <a:xfrm>
-            <a:off x="4145273" y="3661547"/>
-            <a:ext cx="884016" cy="303427"/>
-          </a:xfrm>
-          <a:prstGeom prst="rect">
-            <a:avLst/>
-          </a:prstGeom>
-          <a:solidFill>
-            <a:schemeClr val="tx2">
-              <a:lumMod val="40000"/>
-              <a:lumOff val="60000"/>
-            </a:schemeClr>
-          </a:solidFill>
-          <a:ln>
-            <a:solidFill>
-              <a:schemeClr val="tx1"/>
-            </a:solidFill>
-          </a:ln>
-        </p:spPr>
-        <p:style>
-          <a:lnRef idx="1">
-            <a:schemeClr val="accent1"/>
-          </a:lnRef>
-          <a:fillRef idx="3">
-            <a:schemeClr val="accent1"/>
-          </a:fillRef>
-          <a:effectRef idx="2">
-            <a:schemeClr val="accent1"/>
-          </a:effectRef>
-          <a:fontRef idx="minor">
-            <a:schemeClr val="lt1"/>
-          </a:fontRef>
-        </p:style>
-        <p:txBody>
-          <a:bodyPr rtlCol="0" anchor="ctr"/>
-          <a:lstStyle/>
-          <a:p>
-            <a:pPr algn="ctr"/>
-            <a:r>
-              <a:rPr lang="en-US" sz="1600" dirty="0" err="1">
-                <a:solidFill>
-                  <a:schemeClr val="tx1"/>
-                </a:solidFill>
-              </a:rPr>
-              <a:t>IotEvent</a:t>
-            </a:r>
-            <a:endParaRPr lang="en-US" sz="1600" dirty="0">
-              <a:solidFill>
-                <a:schemeClr val="tx1"/>
-              </a:solidFill>
-            </a:endParaRPr>
-          </a:p>
-        </p:txBody>
-      </p:sp>
-      <p:sp>
-        <p:nvSpPr>
-          <p:cNvPr id="9" name="Rectangle 8"/>
-          <p:cNvSpPr/>
-          <p:nvPr/>
-        </p:nvSpPr>
-        <p:spPr>
-          <a:xfrm>
-            <a:off x="5122808" y="3661546"/>
-            <a:ext cx="1184475" cy="303427"/>
-          </a:xfrm>
-          <a:prstGeom prst="rect">
-            <a:avLst/>
-          </a:prstGeom>
-          <a:solidFill>
-            <a:schemeClr val="tx2">
-              <a:lumMod val="40000"/>
-              <a:lumOff val="60000"/>
-            </a:schemeClr>
-          </a:solidFill>
-          <a:ln>
-            <a:solidFill>
-              <a:schemeClr val="tx1"/>
-            </a:solidFill>
-          </a:ln>
-        </p:spPr>
-        <p:style>
-          <a:lnRef idx="1">
-            <a:schemeClr val="accent1"/>
-          </a:lnRef>
-          <a:fillRef idx="3">
-            <a:schemeClr val="accent1"/>
-          </a:fillRef>
-          <a:effectRef idx="2">
-            <a:schemeClr val="accent1"/>
-          </a:effectRef>
-          <a:fontRef idx="minor">
-            <a:schemeClr val="lt1"/>
-          </a:fontRef>
-        </p:style>
-        <p:txBody>
-          <a:bodyPr rtlCol="0" anchor="ctr"/>
-          <a:lstStyle/>
-          <a:p>
-            <a:pPr algn="ctr"/>
-            <a:r>
-              <a:rPr lang="en-US" sz="1600" dirty="0" err="1">
-                <a:solidFill>
-                  <a:schemeClr val="tx1"/>
-                </a:solidFill>
-              </a:rPr>
-              <a:t>IotProperty</a:t>
-            </a:r>
-            <a:endParaRPr lang="en-US" sz="1600" dirty="0">
-              <a:solidFill>
-                <a:schemeClr val="tx1"/>
-              </a:solidFill>
-            </a:endParaRPr>
-          </a:p>
-        </p:txBody>
-      </p:sp>
-      <p:cxnSp>
-        <p:nvCxnSpPr>
-          <p:cNvPr id="11" name="Straight Arrow Connector 10"/>
-          <p:cNvCxnSpPr/>
-          <p:nvPr/>
-        </p:nvCxnSpPr>
-        <p:spPr>
-          <a:xfrm flipV="1">
-            <a:off x="5517311" y="3064675"/>
-            <a:ext cx="1144111" cy="1"/>
-          </a:xfrm>
-          <a:prstGeom prst="straightConnector1">
-            <a:avLst/>
-          </a:prstGeom>
-          <a:ln w="19050" cmpd="sng">
-            <a:solidFill>
-              <a:srgbClr val="000000"/>
-            </a:solidFill>
-            <a:tailEnd type="stealth" w="lg" len="lg"/>
-          </a:ln>
-        </p:spPr>
-        <p:style>
-          <a:lnRef idx="2">
-            <a:schemeClr val="accent1"/>
-          </a:lnRef>
-          <a:fillRef idx="0">
-            <a:schemeClr val="accent1"/>
-          </a:fillRef>
-          <a:effectRef idx="1">
-            <a:schemeClr val="accent1"/>
-          </a:effectRef>
-          <a:fontRef idx="minor">
-            <a:schemeClr val="tx1"/>
-          </a:fontRef>
-        </p:style>
-      </p:cxnSp>
-      <p:sp>
-        <p:nvSpPr>
-          <p:cNvPr id="12" name="Rectangle 11"/>
-          <p:cNvSpPr/>
-          <p:nvPr/>
-        </p:nvSpPr>
-        <p:spPr>
-          <a:xfrm>
-            <a:off x="5324463" y="2599143"/>
-            <a:ext cx="1643079" cy="338554"/>
-          </a:xfrm>
-          <a:prstGeom prst="rect">
-            <a:avLst/>
-          </a:prstGeom>
-        </p:spPr>
-        <p:txBody>
-          <a:bodyPr wrap="none">
-            <a:spAutoFit/>
-          </a:bodyPr>
-          <a:lstStyle/>
-          <a:p>
-            <a:r>
-              <a:rPr lang="en-US" sz="1600" dirty="0" err="1">
-                <a:solidFill>
-                  <a:schemeClr val="tx1"/>
-                </a:solidFill>
-              </a:rPr>
-              <a:t>acceptsInputData</a:t>
-            </a:r>
-            <a:endParaRPr lang="en-US" sz="1600" dirty="0"/>
-          </a:p>
-        </p:txBody>
-      </p:sp>
-      <p:sp>
-        <p:nvSpPr>
-          <p:cNvPr id="13" name="Rectangle 12"/>
-          <p:cNvSpPr/>
-          <p:nvPr/>
-        </p:nvSpPr>
-        <p:spPr>
-          <a:xfrm>
-            <a:off x="5225658" y="2357826"/>
-            <a:ext cx="1881862" cy="338554"/>
-          </a:xfrm>
-          <a:prstGeom prst="rect">
-            <a:avLst/>
-          </a:prstGeom>
-        </p:spPr>
-        <p:txBody>
-          <a:bodyPr wrap="none">
-            <a:spAutoFit/>
-          </a:bodyPr>
-          <a:lstStyle/>
-          <a:p>
-            <a:r>
-              <a:rPr lang="en-US" sz="1600" dirty="0" err="1">
-                <a:solidFill>
-                  <a:schemeClr val="tx1"/>
-                </a:solidFill>
-              </a:rPr>
-              <a:t>providesOutputData</a:t>
-            </a:r>
-            <a:endParaRPr lang="en-US" sz="1600" dirty="0"/>
-          </a:p>
-        </p:txBody>
-      </p:sp>
-      <p:sp>
-        <p:nvSpPr>
-          <p:cNvPr id="14" name="Rectangle 13"/>
-          <p:cNvSpPr/>
-          <p:nvPr/>
-        </p:nvSpPr>
-        <p:spPr>
-          <a:xfrm>
-            <a:off x="2244150" y="2579983"/>
-            <a:ext cx="2421689" cy="338554"/>
-          </a:xfrm>
-          <a:prstGeom prst="rect">
-            <a:avLst/>
-          </a:prstGeom>
-        </p:spPr>
-        <p:txBody>
-          <a:bodyPr wrap="none">
-            <a:spAutoFit/>
-          </a:bodyPr>
-          <a:lstStyle/>
-          <a:p>
-            <a:r>
-              <a:rPr lang="en-US" sz="1600" dirty="0" err="1">
-                <a:solidFill>
-                  <a:schemeClr val="tx1"/>
-                </a:solidFill>
-              </a:rPr>
-              <a:t>providesInteractionPattern</a:t>
-            </a:r>
-            <a:endParaRPr lang="en-US" sz="1600" dirty="0"/>
-          </a:p>
-        </p:txBody>
-      </p:sp>
-      <p:cxnSp>
-        <p:nvCxnSpPr>
-          <p:cNvPr id="15" name="Straight Arrow Connector 14"/>
-          <p:cNvCxnSpPr/>
-          <p:nvPr/>
-        </p:nvCxnSpPr>
-        <p:spPr>
-          <a:xfrm>
-            <a:off x="1244638" y="4596454"/>
-            <a:ext cx="521916" cy="0"/>
-          </a:xfrm>
-          <a:prstGeom prst="straightConnector1">
-            <a:avLst/>
-          </a:prstGeom>
-          <a:ln w="19050" cmpd="sng">
-            <a:solidFill>
-              <a:srgbClr val="000000"/>
-            </a:solidFill>
-            <a:tailEnd type="triangle" w="lg" len="lg"/>
-          </a:ln>
-        </p:spPr>
-        <p:style>
-          <a:lnRef idx="2">
-            <a:schemeClr val="accent1"/>
-          </a:lnRef>
-          <a:fillRef idx="0">
-            <a:schemeClr val="accent1"/>
-          </a:fillRef>
-          <a:effectRef idx="1">
-            <a:schemeClr val="accent1"/>
-          </a:effectRef>
-          <a:fontRef idx="minor">
-            <a:schemeClr val="tx1"/>
-          </a:fontRef>
-        </p:style>
-      </p:cxnSp>
-      <p:cxnSp>
-        <p:nvCxnSpPr>
-          <p:cNvPr id="16" name="Straight Arrow Connector 15"/>
-          <p:cNvCxnSpPr/>
-          <p:nvPr/>
-        </p:nvCxnSpPr>
-        <p:spPr>
-          <a:xfrm>
-            <a:off x="1236572" y="4952414"/>
-            <a:ext cx="528208" cy="1"/>
-          </a:xfrm>
-          <a:prstGeom prst="straightConnector1">
-            <a:avLst/>
-          </a:prstGeom>
-          <a:ln w="19050" cmpd="sng">
-            <a:solidFill>
-              <a:srgbClr val="000000"/>
-            </a:solidFill>
-            <a:tailEnd type="stealth" w="lg" len="lg"/>
-          </a:ln>
-        </p:spPr>
-        <p:style>
-          <a:lnRef idx="2">
-            <a:schemeClr val="accent1"/>
-          </a:lnRef>
-          <a:fillRef idx="0">
-            <a:schemeClr val="accent1"/>
-          </a:fillRef>
-          <a:effectRef idx="1">
-            <a:schemeClr val="accent1"/>
-          </a:effectRef>
-          <a:fontRef idx="minor">
-            <a:schemeClr val="tx1"/>
-          </a:fontRef>
-        </p:style>
-      </p:cxnSp>
-      <p:sp>
-        <p:nvSpPr>
-          <p:cNvPr id="17" name="Rectangle 16"/>
-          <p:cNvSpPr/>
-          <p:nvPr/>
-        </p:nvSpPr>
-        <p:spPr>
-          <a:xfrm>
-            <a:off x="1781722" y="4420089"/>
-            <a:ext cx="1290725" cy="307777"/>
-          </a:xfrm>
-          <a:prstGeom prst="rect">
-            <a:avLst/>
-          </a:prstGeom>
-        </p:spPr>
-        <p:txBody>
-          <a:bodyPr wrap="none">
-            <a:spAutoFit/>
-          </a:bodyPr>
-          <a:lstStyle/>
-          <a:p>
-            <a:r>
-              <a:rPr lang="en-US" sz="1400">
-                <a:solidFill>
-                  <a:schemeClr val="tx1"/>
-                </a:solidFill>
-              </a:rPr>
-              <a:t>rdfs:subclassOf</a:t>
-            </a:r>
-            <a:endParaRPr lang="en-US" sz="1400"/>
-          </a:p>
-        </p:txBody>
-      </p:sp>
-      <p:sp>
-        <p:nvSpPr>
-          <p:cNvPr id="18" name="Rectangle 17"/>
-          <p:cNvSpPr/>
-          <p:nvPr/>
-        </p:nvSpPr>
-        <p:spPr>
-          <a:xfrm>
-            <a:off x="1781722" y="4767556"/>
-            <a:ext cx="1429586" cy="307777"/>
-          </a:xfrm>
-          <a:prstGeom prst="rect">
-            <a:avLst/>
-          </a:prstGeom>
-        </p:spPr>
-        <p:txBody>
-          <a:bodyPr wrap="none">
-            <a:spAutoFit/>
-          </a:bodyPr>
-          <a:lstStyle/>
-          <a:p>
-            <a:r>
-              <a:rPr lang="en-US" sz="1400" dirty="0" err="1"/>
-              <a:t>schema:Property</a:t>
-            </a:r>
-            <a:endParaRPr lang="en-US" sz="1400" dirty="0"/>
-          </a:p>
-        </p:txBody>
-      </p:sp>
-      <p:sp>
-        <p:nvSpPr>
-          <p:cNvPr id="19" name="Rectangle 18"/>
-          <p:cNvSpPr/>
-          <p:nvPr/>
-        </p:nvSpPr>
-        <p:spPr>
-          <a:xfrm>
-            <a:off x="1240674" y="5252981"/>
-            <a:ext cx="1705551" cy="303427"/>
-          </a:xfrm>
-          <a:prstGeom prst="rect">
-            <a:avLst/>
-          </a:prstGeom>
-          <a:solidFill>
-            <a:schemeClr val="tx2">
-              <a:lumMod val="40000"/>
-              <a:lumOff val="60000"/>
-            </a:schemeClr>
-          </a:solidFill>
-          <a:ln>
-            <a:solidFill>
-              <a:schemeClr val="tx1"/>
-            </a:solidFill>
-          </a:ln>
-        </p:spPr>
-        <p:style>
-          <a:lnRef idx="1">
-            <a:schemeClr val="accent1"/>
-          </a:lnRef>
-          <a:fillRef idx="3">
-            <a:schemeClr val="accent1"/>
-          </a:fillRef>
-          <a:effectRef idx="2">
-            <a:schemeClr val="accent1"/>
-          </a:effectRef>
-          <a:fontRef idx="minor">
-            <a:schemeClr val="lt1"/>
-          </a:fontRef>
-        </p:style>
-        <p:txBody>
-          <a:bodyPr rtlCol="0" anchor="ctr"/>
-          <a:lstStyle/>
-          <a:p>
-            <a:pPr algn="ctr"/>
-            <a:r>
-              <a:rPr lang="en-US" sz="1400">
-                <a:solidFill>
-                  <a:schemeClr val="tx1"/>
-                </a:solidFill>
-              </a:rPr>
-              <a:t>iotschema Class</a:t>
-            </a:r>
-          </a:p>
-        </p:txBody>
-      </p:sp>
-      <p:sp>
-        <p:nvSpPr>
-          <p:cNvPr id="20" name="Rectangle 19"/>
-          <p:cNvSpPr/>
-          <p:nvPr/>
-        </p:nvSpPr>
-        <p:spPr>
-          <a:xfrm>
-            <a:off x="1240674" y="5677851"/>
-            <a:ext cx="1705551" cy="303427"/>
-          </a:xfrm>
-          <a:prstGeom prst="rect">
-            <a:avLst/>
-          </a:prstGeom>
-          <a:noFill/>
-          <a:ln>
-            <a:solidFill>
-              <a:schemeClr val="tx1"/>
-            </a:solidFill>
-          </a:ln>
-        </p:spPr>
-        <p:style>
-          <a:lnRef idx="1">
-            <a:schemeClr val="accent1"/>
-          </a:lnRef>
-          <a:fillRef idx="3">
-            <a:schemeClr val="accent1"/>
-          </a:fillRef>
-          <a:effectRef idx="2">
-            <a:schemeClr val="accent1"/>
-          </a:effectRef>
-          <a:fontRef idx="minor">
-            <a:schemeClr val="lt1"/>
-          </a:fontRef>
-        </p:style>
-        <p:txBody>
-          <a:bodyPr rtlCol="0" anchor="ctr"/>
-          <a:lstStyle/>
-          <a:p>
-            <a:pPr algn="ctr"/>
-            <a:r>
-              <a:rPr lang="en-US" sz="1400">
-                <a:solidFill>
-                  <a:schemeClr val="tx1"/>
-                </a:solidFill>
-              </a:rPr>
-              <a:t>Reused Class</a:t>
-            </a:r>
-          </a:p>
-        </p:txBody>
-      </p:sp>
-      <p:sp>
-        <p:nvSpPr>
-          <p:cNvPr id="21" name="Rectangle 20"/>
-          <p:cNvSpPr/>
-          <p:nvPr/>
-        </p:nvSpPr>
-        <p:spPr>
-          <a:xfrm>
-            <a:off x="942160" y="4309472"/>
-            <a:ext cx="2397970" cy="1821167"/>
-          </a:xfrm>
-          <a:prstGeom prst="rect">
-            <a:avLst/>
-          </a:prstGeom>
-          <a:noFill/>
-          <a:ln>
-            <a:solidFill>
-              <a:srgbClr val="000000"/>
-            </a:solidFill>
-            <a:prstDash val="lgDash"/>
-          </a:ln>
-        </p:spPr>
-        <p:style>
-          <a:lnRef idx="1">
-            <a:schemeClr val="accent1"/>
-          </a:lnRef>
-          <a:fillRef idx="3">
-            <a:schemeClr val="accent1"/>
-          </a:fillRef>
-          <a:effectRef idx="2">
-            <a:schemeClr val="accent1"/>
-          </a:effectRef>
-          <a:fontRef idx="minor">
-            <a:schemeClr val="lt1"/>
-          </a:fontRef>
-        </p:style>
-        <p:txBody>
-          <a:bodyPr rtlCol="0" anchor="ctr"/>
-          <a:lstStyle/>
-          <a:p>
-            <a:pPr algn="ctr"/>
-            <a:endParaRPr lang="en-US"/>
-          </a:p>
-        </p:txBody>
-      </p:sp>
-      <p:sp>
-        <p:nvSpPr>
-          <p:cNvPr id="22" name="Rectangle 21"/>
-          <p:cNvSpPr/>
-          <p:nvPr/>
-        </p:nvSpPr>
-        <p:spPr>
-          <a:xfrm>
-            <a:off x="6661422" y="2912961"/>
-            <a:ext cx="1705551" cy="303427"/>
-          </a:xfrm>
-          <a:prstGeom prst="rect">
-            <a:avLst/>
-          </a:prstGeom>
-          <a:solidFill>
-            <a:schemeClr val="tx2">
-              <a:lumMod val="40000"/>
-              <a:lumOff val="60000"/>
-            </a:schemeClr>
-          </a:solidFill>
-          <a:ln>
-            <a:solidFill>
-              <a:schemeClr val="tx1"/>
-            </a:solidFill>
-          </a:ln>
-        </p:spPr>
-        <p:style>
-          <a:lnRef idx="1">
-            <a:schemeClr val="accent1"/>
-          </a:lnRef>
-          <a:fillRef idx="3">
-            <a:schemeClr val="accent1"/>
-          </a:fillRef>
-          <a:effectRef idx="2">
-            <a:schemeClr val="accent1"/>
-          </a:effectRef>
-          <a:fontRef idx="minor">
-            <a:schemeClr val="lt1"/>
-          </a:fontRef>
-        </p:style>
-        <p:txBody>
-          <a:bodyPr rtlCol="0" anchor="ctr"/>
-          <a:lstStyle/>
-          <a:p>
-            <a:pPr algn="ctr"/>
-            <a:r>
-              <a:rPr lang="en-US" sz="1600" dirty="0" err="1">
-                <a:solidFill>
-                  <a:schemeClr val="tx1"/>
-                </a:solidFill>
-              </a:rPr>
-              <a:t>IotDataItem</a:t>
-            </a:r>
-            <a:endParaRPr lang="en-US" sz="1600" dirty="0">
-              <a:solidFill>
-                <a:schemeClr val="tx1"/>
-              </a:solidFill>
-            </a:endParaRPr>
-          </a:p>
-        </p:txBody>
-      </p:sp>
-      <p:cxnSp>
-        <p:nvCxnSpPr>
-          <p:cNvPr id="23" name="Straight Arrow Connector 22"/>
-          <p:cNvCxnSpPr/>
-          <p:nvPr/>
-        </p:nvCxnSpPr>
-        <p:spPr>
-          <a:xfrm flipH="1">
-            <a:off x="3569798" y="3431842"/>
-            <a:ext cx="1586" cy="231072"/>
-          </a:xfrm>
-          <a:prstGeom prst="straightConnector1">
-            <a:avLst/>
-          </a:prstGeom>
-          <a:ln w="19050" cmpd="sng">
-            <a:solidFill>
-              <a:schemeClr val="tx1"/>
-            </a:solidFill>
-            <a:tailEnd type="triangle" w="lg" len="lg"/>
-          </a:ln>
-        </p:spPr>
-        <p:style>
-          <a:lnRef idx="2">
-            <a:schemeClr val="accent1"/>
-          </a:lnRef>
-          <a:fillRef idx="0">
-            <a:schemeClr val="accent1"/>
-          </a:fillRef>
-          <a:effectRef idx="1">
-            <a:schemeClr val="accent1"/>
-          </a:effectRef>
-          <a:fontRef idx="minor">
-            <a:schemeClr val="tx1"/>
-          </a:fontRef>
-        </p:style>
-      </p:cxnSp>
-      <p:cxnSp>
-        <p:nvCxnSpPr>
-          <p:cNvPr id="24" name="Straight Arrow Connector 23"/>
-          <p:cNvCxnSpPr/>
-          <p:nvPr/>
-        </p:nvCxnSpPr>
-        <p:spPr>
-          <a:xfrm flipH="1">
-            <a:off x="5739489" y="3430474"/>
-            <a:ext cx="1586" cy="231072"/>
-          </a:xfrm>
-          <a:prstGeom prst="straightConnector1">
-            <a:avLst/>
-          </a:prstGeom>
-          <a:ln w="19050" cmpd="sng">
-            <a:solidFill>
-              <a:schemeClr val="tx1"/>
-            </a:solidFill>
-            <a:tailEnd type="triangle" w="lg" len="lg"/>
-          </a:ln>
-        </p:spPr>
-        <p:style>
-          <a:lnRef idx="2">
-            <a:schemeClr val="accent1"/>
-          </a:lnRef>
-          <a:fillRef idx="0">
-            <a:schemeClr val="accent1"/>
-          </a:fillRef>
-          <a:effectRef idx="1">
-            <a:schemeClr val="accent1"/>
-          </a:effectRef>
-          <a:fontRef idx="minor">
-            <a:schemeClr val="tx1"/>
-          </a:fontRef>
-        </p:style>
-      </p:cxnSp>
-      <p:cxnSp>
-        <p:nvCxnSpPr>
-          <p:cNvPr id="25" name="Straight Arrow Connector 24"/>
-          <p:cNvCxnSpPr/>
-          <p:nvPr/>
-        </p:nvCxnSpPr>
-        <p:spPr>
-          <a:xfrm flipH="1">
-            <a:off x="4660650" y="3430474"/>
-            <a:ext cx="1586" cy="231072"/>
-          </a:xfrm>
-          <a:prstGeom prst="straightConnector1">
-            <a:avLst/>
-          </a:prstGeom>
-          <a:ln w="19050" cmpd="sng">
-            <a:solidFill>
-              <a:schemeClr val="tx1"/>
-            </a:solidFill>
-            <a:tailEnd type="triangle" w="lg" len="lg"/>
-          </a:ln>
-        </p:spPr>
-        <p:style>
-          <a:lnRef idx="2">
-            <a:schemeClr val="accent1"/>
-          </a:lnRef>
-          <a:fillRef idx="0">
-            <a:schemeClr val="accent1"/>
-          </a:fillRef>
-          <a:effectRef idx="1">
-            <a:schemeClr val="accent1"/>
-          </a:effectRef>
-          <a:fontRef idx="minor">
-            <a:schemeClr val="tx1"/>
-          </a:fontRef>
-        </p:style>
-      </p:cxnSp>
-      <p:cxnSp>
-        <p:nvCxnSpPr>
-          <p:cNvPr id="26" name="Straight Arrow Connector 25"/>
-          <p:cNvCxnSpPr/>
-          <p:nvPr/>
-        </p:nvCxnSpPr>
-        <p:spPr>
-          <a:xfrm flipH="1">
-            <a:off x="3577230" y="3435702"/>
-            <a:ext cx="2162259" cy="0"/>
-          </a:xfrm>
-          <a:prstGeom prst="straightConnector1">
-            <a:avLst/>
-          </a:prstGeom>
-          <a:ln w="19050" cmpd="sng">
-            <a:solidFill>
-              <a:schemeClr val="tx1"/>
-            </a:solidFill>
-            <a:headEnd type="none" w="med" len="med"/>
-            <a:tailEnd type="none" w="med" len="med"/>
-          </a:ln>
-        </p:spPr>
-        <p:style>
-          <a:lnRef idx="2">
-            <a:schemeClr val="accent1"/>
-          </a:lnRef>
-          <a:fillRef idx="0">
-            <a:schemeClr val="accent1"/>
-          </a:fillRef>
-          <a:effectRef idx="1">
-            <a:schemeClr val="accent1"/>
-          </a:effectRef>
-          <a:fontRef idx="minor">
-            <a:schemeClr val="tx1"/>
-          </a:fontRef>
-        </p:style>
-      </p:cxnSp>
-      <p:cxnSp>
-        <p:nvCxnSpPr>
-          <p:cNvPr id="27" name="Straight Arrow Connector 26"/>
-          <p:cNvCxnSpPr/>
-          <p:nvPr/>
-        </p:nvCxnSpPr>
-        <p:spPr>
-          <a:xfrm flipV="1">
-            <a:off x="4669882" y="3216389"/>
-            <a:ext cx="1" cy="223174"/>
-          </a:xfrm>
-          <a:prstGeom prst="straightConnector1">
-            <a:avLst/>
-          </a:prstGeom>
-          <a:ln w="19050" cmpd="sng">
-            <a:solidFill>
-              <a:schemeClr val="tx1"/>
-            </a:solidFill>
-            <a:headEnd type="none"/>
-            <a:tailEnd type="none" w="lg" len="lg"/>
-          </a:ln>
-        </p:spPr>
-        <p:style>
-          <a:lnRef idx="2">
-            <a:schemeClr val="accent1"/>
-          </a:lnRef>
-          <a:fillRef idx="0">
-            <a:schemeClr val="accent1"/>
-          </a:fillRef>
-          <a:effectRef idx="1">
-            <a:schemeClr val="accent1"/>
-          </a:effectRef>
-          <a:fontRef idx="minor">
-            <a:schemeClr val="tx1"/>
-          </a:fontRef>
-        </p:style>
-      </p:cxnSp>
-      <p:sp>
-        <p:nvSpPr>
-          <p:cNvPr id="29" name="Rectangle 28"/>
-          <p:cNvSpPr/>
-          <p:nvPr/>
-        </p:nvSpPr>
-        <p:spPr>
-          <a:xfrm>
-            <a:off x="6387243" y="3519817"/>
-            <a:ext cx="2256228" cy="303427"/>
-          </a:xfrm>
-          <a:prstGeom prst="rect">
-            <a:avLst/>
-          </a:prstGeom>
-          <a:solidFill>
-            <a:srgbClr val="FFFFFF"/>
-          </a:solidFill>
-          <a:ln>
-            <a:solidFill>
-              <a:schemeClr val="tx1"/>
-            </a:solidFill>
-          </a:ln>
-        </p:spPr>
-        <p:style>
-          <a:lnRef idx="1">
-            <a:schemeClr val="accent1"/>
-          </a:lnRef>
-          <a:fillRef idx="3">
-            <a:schemeClr val="accent1"/>
-          </a:fillRef>
-          <a:effectRef idx="2">
-            <a:schemeClr val="accent1"/>
-          </a:effectRef>
-          <a:fontRef idx="minor">
-            <a:schemeClr val="lt1"/>
-          </a:fontRef>
-        </p:style>
-        <p:txBody>
-          <a:bodyPr rtlCol="0" anchor="ctr"/>
-          <a:lstStyle/>
-          <a:p>
-            <a:pPr algn="ctr"/>
-            <a:r>
-              <a:rPr lang="en-US" sz="1400">
-                <a:solidFill>
-                  <a:schemeClr val="tx1"/>
-                </a:solidFill>
-              </a:rPr>
-              <a:t>schema:PropertyValue</a:t>
-            </a:r>
-          </a:p>
-        </p:txBody>
-      </p:sp>
-      <p:sp>
-        <p:nvSpPr>
-          <p:cNvPr id="30" name="Rectangle 29"/>
-          <p:cNvSpPr/>
-          <p:nvPr/>
-        </p:nvSpPr>
-        <p:spPr>
-          <a:xfrm>
-            <a:off x="6387243" y="3838244"/>
-            <a:ext cx="2256229" cy="303427"/>
-          </a:xfrm>
-          <a:prstGeom prst="rect">
-            <a:avLst/>
-          </a:prstGeom>
-          <a:solidFill>
-            <a:srgbClr val="FFFFFF"/>
-          </a:solidFill>
-          <a:ln>
-            <a:solidFill>
-              <a:schemeClr val="tx1"/>
-            </a:solidFill>
-          </a:ln>
-        </p:spPr>
-        <p:style>
-          <a:lnRef idx="1">
-            <a:schemeClr val="accent1"/>
-          </a:lnRef>
-          <a:fillRef idx="3">
-            <a:schemeClr val="accent1"/>
-          </a:fillRef>
-          <a:effectRef idx="2">
-            <a:schemeClr val="accent1"/>
-          </a:effectRef>
-          <a:fontRef idx="minor">
-            <a:schemeClr val="lt1"/>
-          </a:fontRef>
-        </p:style>
-        <p:txBody>
-          <a:bodyPr rtlCol="0" anchor="ctr"/>
-          <a:lstStyle/>
-          <a:p>
-            <a:pPr algn="ctr"/>
-            <a:r>
-              <a:rPr lang="en-US" sz="1400">
-                <a:solidFill>
-                  <a:schemeClr val="tx1"/>
-                </a:solidFill>
-              </a:rPr>
-              <a:t>schema:PropertyValueSpec</a:t>
-            </a:r>
-            <a:r>
-              <a:rPr lang="en-US" sz="1400" dirty="0">
-                <a:solidFill>
-                  <a:schemeClr val="tx1"/>
-                </a:solidFill>
-              </a:rPr>
-              <a:t>.</a:t>
-            </a:r>
-          </a:p>
-        </p:txBody>
-      </p:sp>
-      <p:cxnSp>
-        <p:nvCxnSpPr>
-          <p:cNvPr id="31" name="Straight Arrow Connector 30"/>
-          <p:cNvCxnSpPr>
-            <a:endCxn id="30" idx="0"/>
-          </p:cNvCxnSpPr>
-          <p:nvPr/>
-        </p:nvCxnSpPr>
-        <p:spPr>
-          <a:xfrm>
-            <a:off x="7514198" y="3216388"/>
-            <a:ext cx="1159" cy="303429"/>
-          </a:xfrm>
-          <a:prstGeom prst="straightConnector1">
-            <a:avLst/>
-          </a:prstGeom>
-          <a:ln w="19050" cmpd="sng">
-            <a:solidFill>
-              <a:srgbClr val="000000"/>
-            </a:solidFill>
-            <a:tailEnd type="stealth" w="lg" len="lg"/>
-          </a:ln>
-        </p:spPr>
-        <p:style>
-          <a:lnRef idx="2">
-            <a:schemeClr val="accent1"/>
-          </a:lnRef>
-          <a:fillRef idx="0">
-            <a:schemeClr val="accent1"/>
-          </a:fillRef>
-          <a:effectRef idx="1">
-            <a:schemeClr val="accent1"/>
-          </a:effectRef>
-          <a:fontRef idx="minor">
-            <a:schemeClr val="tx1"/>
-          </a:fontRef>
-        </p:style>
-      </p:cxnSp>
-      <p:cxnSp>
-        <p:nvCxnSpPr>
-          <p:cNvPr id="32" name="Straight Arrow Connector 31"/>
-          <p:cNvCxnSpPr>
-            <a:endCxn id="6" idx="1"/>
-          </p:cNvCxnSpPr>
-          <p:nvPr/>
-        </p:nvCxnSpPr>
-        <p:spPr>
-          <a:xfrm flipV="1">
-            <a:off x="2717185" y="3064676"/>
-            <a:ext cx="1094575" cy="9913"/>
-          </a:xfrm>
-          <a:prstGeom prst="straightConnector1">
-            <a:avLst/>
-          </a:prstGeom>
-          <a:ln w="19050" cmpd="sng">
-            <a:solidFill>
-              <a:srgbClr val="000000"/>
-            </a:solidFill>
-            <a:tailEnd type="stealth" w="lg" len="lg"/>
-          </a:ln>
-        </p:spPr>
-        <p:style>
-          <a:lnRef idx="2">
-            <a:schemeClr val="accent1"/>
-          </a:lnRef>
-          <a:fillRef idx="0">
-            <a:schemeClr val="accent1"/>
-          </a:fillRef>
-          <a:effectRef idx="1">
-            <a:schemeClr val="accent1"/>
-          </a:effectRef>
-          <a:fontRef idx="minor">
-            <a:schemeClr val="tx1"/>
-          </a:fontRef>
-        </p:style>
-      </p:cxnSp>
-      <p:cxnSp>
-        <p:nvCxnSpPr>
-          <p:cNvPr id="34" name="Straight Arrow Connector 33"/>
-          <p:cNvCxnSpPr>
-            <a:stCxn id="35" idx="2"/>
-            <a:endCxn id="5" idx="0"/>
-          </p:cNvCxnSpPr>
-          <p:nvPr/>
-        </p:nvCxnSpPr>
-        <p:spPr>
-          <a:xfrm>
-            <a:off x="1852382" y="2319110"/>
-            <a:ext cx="2513" cy="593852"/>
-          </a:xfrm>
-          <a:prstGeom prst="straightConnector1">
-            <a:avLst/>
-          </a:prstGeom>
-          <a:ln w="19050" cmpd="sng">
-            <a:solidFill>
-              <a:srgbClr val="000000"/>
-            </a:solidFill>
-            <a:tailEnd type="triangle" w="lg" len="lg"/>
-          </a:ln>
-        </p:spPr>
-        <p:style>
-          <a:lnRef idx="2">
-            <a:schemeClr val="accent1"/>
-          </a:lnRef>
-          <a:fillRef idx="0">
-            <a:schemeClr val="accent1"/>
-          </a:fillRef>
-          <a:effectRef idx="1">
-            <a:schemeClr val="accent1"/>
-          </a:effectRef>
-          <a:fontRef idx="minor">
-            <a:schemeClr val="tx1"/>
-          </a:fontRef>
-        </p:style>
-      </p:cxnSp>
-      <p:sp>
-        <p:nvSpPr>
-          <p:cNvPr id="35" name="Rectangle 34"/>
-          <p:cNvSpPr/>
-          <p:nvPr/>
-        </p:nvSpPr>
-        <p:spPr>
-          <a:xfrm>
-            <a:off x="999606" y="2015683"/>
-            <a:ext cx="1705551" cy="303427"/>
-          </a:xfrm>
-          <a:prstGeom prst="rect">
-            <a:avLst/>
-          </a:prstGeom>
-          <a:solidFill>
-            <a:schemeClr val="tx2">
-              <a:lumMod val="40000"/>
-              <a:lumOff val="60000"/>
-            </a:schemeClr>
-          </a:solidFill>
-          <a:ln>
-            <a:solidFill>
-              <a:schemeClr val="tx1"/>
-            </a:solidFill>
-          </a:ln>
-        </p:spPr>
-        <p:style>
-          <a:lnRef idx="1">
-            <a:schemeClr val="accent1"/>
-          </a:lnRef>
-          <a:fillRef idx="3">
-            <a:schemeClr val="accent1"/>
-          </a:fillRef>
-          <a:effectRef idx="2">
-            <a:schemeClr val="accent1"/>
-          </a:effectRef>
-          <a:fontRef idx="minor">
-            <a:schemeClr val="lt1"/>
-          </a:fontRef>
-        </p:style>
-        <p:txBody>
-          <a:bodyPr rtlCol="0" anchor="ctr"/>
-          <a:lstStyle/>
-          <a:p>
-            <a:pPr algn="ctr"/>
-            <a:r>
-              <a:rPr lang="en-US" sz="1600" dirty="0" err="1">
-                <a:solidFill>
-                  <a:schemeClr val="tx1"/>
-                </a:solidFill>
-              </a:rPr>
-              <a:t>IotThing</a:t>
-            </a:r>
-            <a:endParaRPr lang="en-US" sz="1600" dirty="0">
-              <a:solidFill>
-                <a:schemeClr val="tx1"/>
-              </a:solidFill>
-            </a:endParaRPr>
-          </a:p>
-        </p:txBody>
-      </p:sp>
-      <p:sp>
-        <p:nvSpPr>
-          <p:cNvPr id="36" name="Rectangle 35"/>
-          <p:cNvSpPr/>
-          <p:nvPr/>
-        </p:nvSpPr>
-        <p:spPr>
-          <a:xfrm>
-            <a:off x="332413" y="2319271"/>
-            <a:ext cx="1519968" cy="584775"/>
-          </a:xfrm>
-          <a:prstGeom prst="rect">
-            <a:avLst/>
-          </a:prstGeom>
-        </p:spPr>
-        <p:txBody>
-          <a:bodyPr wrap="none">
-            <a:spAutoFit/>
-          </a:bodyPr>
-          <a:lstStyle/>
-          <a:p>
-            <a:pPr algn="r"/>
-            <a:r>
-              <a:rPr lang="en-US" sz="1600" dirty="0" err="1"/>
-              <a:t>hasIotThing</a:t>
-            </a:r>
-            <a:endParaRPr lang="en-US" sz="1600" dirty="0"/>
-          </a:p>
-          <a:p>
-            <a:pPr algn="r"/>
-            <a:r>
-              <a:rPr lang="en-US" sz="1600" dirty="0" err="1">
-                <a:solidFill>
-                  <a:schemeClr val="tx1"/>
-                </a:solidFill>
-              </a:rPr>
-              <a:t>hasIotCapability</a:t>
-            </a:r>
-            <a:endParaRPr lang="en-US" sz="1600" dirty="0">
-              <a:solidFill>
-                <a:schemeClr val="tx1"/>
-              </a:solidFill>
-            </a:endParaRPr>
-          </a:p>
-        </p:txBody>
-      </p:sp>
-      <p:cxnSp>
-        <p:nvCxnSpPr>
-          <p:cNvPr id="37" name="Straight Arrow Connector 36"/>
-          <p:cNvCxnSpPr>
-            <a:stCxn id="4" idx="1"/>
-            <a:endCxn id="35" idx="3"/>
-          </p:cNvCxnSpPr>
-          <p:nvPr/>
-        </p:nvCxnSpPr>
-        <p:spPr>
-          <a:xfrm flipH="1">
-            <a:off x="2705157" y="2167120"/>
-            <a:ext cx="562236" cy="277"/>
-          </a:xfrm>
-          <a:prstGeom prst="straightConnector1">
-            <a:avLst/>
-          </a:prstGeom>
-          <a:ln w="19050" cmpd="sng">
-            <a:solidFill>
-              <a:srgbClr val="000000"/>
-            </a:solidFill>
-            <a:tailEnd type="triangle" w="lg" len="lg"/>
-          </a:ln>
-        </p:spPr>
-        <p:style>
-          <a:lnRef idx="2">
-            <a:schemeClr val="accent1"/>
-          </a:lnRef>
-          <a:fillRef idx="0">
-            <a:schemeClr val="accent1"/>
-          </a:fillRef>
-          <a:effectRef idx="1">
-            <a:schemeClr val="accent1"/>
-          </a:effectRef>
-          <a:fontRef idx="minor">
-            <a:schemeClr val="tx1"/>
-          </a:fontRef>
-        </p:style>
-      </p:cxnSp>
+            <a:off x="508906" y="56427"/>
+            <a:ext cx="7981949" cy="1325563"/>
+          </a:xfrm>
+        </p:spPr>
+        <p:txBody>
+          <a:bodyPr/>
+          <a:lstStyle/>
+          <a:p>
+            <a:r>
+              <a:rPr lang="en-US" dirty="0" err="1"/>
+              <a:t>iotschema</a:t>
+            </a:r>
+            <a:r>
+              <a:rPr lang="en-US" dirty="0"/>
+              <a:t> UML with </a:t>
+            </a:r>
+            <a:r>
+              <a:rPr lang="en-US" dirty="0" err="1"/>
+              <a:t>iotThing</a:t>
+            </a:r>
+            <a:r>
+              <a:rPr lang="en-US" dirty="0"/>
+              <a:t> class </a:t>
+            </a:r>
+          </a:p>
+        </p:txBody>
+      </p:sp>
     </p:spTree>
     <p:extLst>
       <p:ext uri="{BB962C8B-B14F-4D97-AF65-F5344CB8AC3E}">
-        <p14:creationId xmlns:p14="http://schemas.microsoft.com/office/powerpoint/2010/main" val="348101098"/>
+        <p14:creationId xmlns:p14="http://schemas.microsoft.com/office/powerpoint/2010/main" val="1144329561"/>
       </p:ext>
     </p:extLst>
   </p:cSld>
@@ -8690,80 +7236,1456 @@
           <a:chExt cx="0" cy="0"/>
         </a:xfrm>
       </p:grpSpPr>
-      <p:pic>
-        <p:nvPicPr>
-          <p:cNvPr id="3" name="Picture 2"/>
-          <p:cNvPicPr>
-            <a:picLocks noChangeAspect="1"/>
-          </p:cNvPicPr>
+      <p:sp>
+        <p:nvSpPr>
+          <p:cNvPr id="2" name="Title 1"/>
+          <p:cNvSpPr>
+            <a:spLocks noGrp="1"/>
+          </p:cNvSpPr>
+          <p:nvPr>
+            <p:ph type="title"/>
+          </p:nvPr>
+        </p:nvSpPr>
+        <p:spPr>
+          <a:xfrm>
+            <a:off x="559342" y="284843"/>
+            <a:ext cx="7886700" cy="1325563"/>
+          </a:xfrm>
+        </p:spPr>
+        <p:txBody>
+          <a:bodyPr/>
+          <a:lstStyle/>
+          <a:p>
+            <a:r>
+              <a:rPr lang="en-US" dirty="0" err="1"/>
+              <a:t>schema.org</a:t>
+            </a:r>
+            <a:r>
+              <a:rPr lang="en-US" dirty="0"/>
+              <a:t> </a:t>
+            </a:r>
+            <a:r>
+              <a:rPr lang="en-US" dirty="0" err="1"/>
+              <a:t>IoT</a:t>
+            </a:r>
+            <a:r>
+              <a:rPr lang="en-US" dirty="0"/>
+              <a:t> Extension</a:t>
+            </a:r>
+            <a:br>
+              <a:rPr lang="en-US" dirty="0"/>
+            </a:br>
+            <a:r>
+              <a:rPr lang="en-US" dirty="0"/>
+              <a:t>Meta Model with Thing Class</a:t>
+            </a:r>
+          </a:p>
+        </p:txBody>
+      </p:sp>
+      <p:sp>
+        <p:nvSpPr>
+          <p:cNvPr id="4" name="Rectangle 3"/>
+          <p:cNvSpPr/>
           <p:nvPr/>
-        </p:nvPicPr>
-        <p:blipFill>
-          <a:blip r:embed="rId2">
-            <a:extLst>
-              <a:ext uri="{28A0092B-C50C-407E-A947-70E740481C1C}">
-                <a14:useLocalDpi xmlns:a14="http://schemas.microsoft.com/office/drawing/2010/main" val="0"/>
-              </a:ext>
-            </a:extLst>
-          </a:blip>
-          <a:stretch>
-            <a:fillRect/>
-          </a:stretch>
-        </p:blipFill>
+        </p:nvSpPr>
         <p:spPr>
           <a:xfrm>
-            <a:off x="1509264" y="1381990"/>
-            <a:ext cx="6981591" cy="4841009"/>
+            <a:off x="3267393" y="2015406"/>
+            <a:ext cx="1705551" cy="303427"/>
           </a:xfrm>
           <a:prstGeom prst="rect">
             <a:avLst/>
           </a:prstGeom>
-        </p:spPr>
-      </p:pic>
-      <p:sp>
-        <p:nvSpPr>
-          <p:cNvPr id="2" name="Title 1"/>
-          <p:cNvSpPr>
-            <a:spLocks noGrp="1"/>
-          </p:cNvSpPr>
-          <p:nvPr>
-            <p:ph type="title"/>
-          </p:nvPr>
+          <a:noFill/>
+          <a:ln>
+            <a:solidFill>
+              <a:schemeClr val="tx1"/>
+            </a:solidFill>
+          </a:ln>
+        </p:spPr>
+        <p:style>
+          <a:lnRef idx="1">
+            <a:schemeClr val="accent1"/>
+          </a:lnRef>
+          <a:fillRef idx="3">
+            <a:schemeClr val="accent1"/>
+          </a:fillRef>
+          <a:effectRef idx="2">
+            <a:schemeClr val="accent1"/>
+          </a:effectRef>
+          <a:fontRef idx="minor">
+            <a:schemeClr val="lt1"/>
+          </a:fontRef>
+        </p:style>
+        <p:txBody>
+          <a:bodyPr rtlCol="0" anchor="ctr"/>
+          <a:lstStyle/>
+          <a:p>
+            <a:pPr algn="ctr"/>
+            <a:r>
+              <a:rPr lang="en-US" sz="1600" dirty="0" err="1">
+                <a:solidFill>
+                  <a:schemeClr val="tx1"/>
+                </a:solidFill>
+              </a:rPr>
+              <a:t>schema:thing</a:t>
+            </a:r>
+            <a:endParaRPr lang="en-US" sz="1600" dirty="0">
+              <a:solidFill>
+                <a:schemeClr val="tx1"/>
+              </a:solidFill>
+            </a:endParaRPr>
+          </a:p>
+        </p:txBody>
+      </p:sp>
+      <p:sp>
+        <p:nvSpPr>
+          <p:cNvPr id="5" name="Rectangle 4"/>
+          <p:cNvSpPr/>
+          <p:nvPr/>
         </p:nvSpPr>
         <p:spPr>
           <a:xfrm>
-            <a:off x="508906" y="56427"/>
-            <a:ext cx="7981949" cy="1325563"/>
-          </a:xfrm>
-        </p:spPr>
-        <p:txBody>
-          <a:bodyPr/>
-          <a:lstStyle/>
-          <a:p>
-            <a:r>
-              <a:rPr lang="en-US" dirty="0" err="1" smtClean="0"/>
-              <a:t>iotschema</a:t>
-            </a:r>
-            <a:r>
-              <a:rPr lang="en-US" dirty="0" smtClean="0"/>
-              <a:t> UML with </a:t>
-            </a:r>
-            <a:r>
-              <a:rPr lang="en-US" dirty="0" err="1" smtClean="0"/>
-              <a:t>iotThing</a:t>
-            </a:r>
-            <a:r>
-              <a:rPr lang="en-US" dirty="0" smtClean="0"/>
-              <a:t> class </a:t>
-            </a:r>
-            <a:endParaRPr lang="en-US" dirty="0"/>
-          </a:p>
-        </p:txBody>
-      </p:sp>
+            <a:off x="1002119" y="2912962"/>
+            <a:ext cx="1705551" cy="303427"/>
+          </a:xfrm>
+          <a:prstGeom prst="rect">
+            <a:avLst/>
+          </a:prstGeom>
+          <a:solidFill>
+            <a:schemeClr val="tx2">
+              <a:lumMod val="40000"/>
+              <a:lumOff val="60000"/>
+            </a:schemeClr>
+          </a:solidFill>
+          <a:ln>
+            <a:solidFill>
+              <a:schemeClr val="tx1"/>
+            </a:solidFill>
+          </a:ln>
+        </p:spPr>
+        <p:style>
+          <a:lnRef idx="1">
+            <a:schemeClr val="accent1"/>
+          </a:lnRef>
+          <a:fillRef idx="3">
+            <a:schemeClr val="accent1"/>
+          </a:fillRef>
+          <a:effectRef idx="2">
+            <a:schemeClr val="accent1"/>
+          </a:effectRef>
+          <a:fontRef idx="minor">
+            <a:schemeClr val="lt1"/>
+          </a:fontRef>
+        </p:style>
+        <p:txBody>
+          <a:bodyPr rtlCol="0" anchor="ctr"/>
+          <a:lstStyle/>
+          <a:p>
+            <a:pPr algn="ctr"/>
+            <a:r>
+              <a:rPr lang="en-US" sz="1600" dirty="0" err="1">
+                <a:solidFill>
+                  <a:schemeClr val="tx1"/>
+                </a:solidFill>
+              </a:rPr>
+              <a:t>IotCapability</a:t>
+            </a:r>
+            <a:endParaRPr lang="en-US" sz="1600" dirty="0">
+              <a:solidFill>
+                <a:schemeClr val="tx1"/>
+              </a:solidFill>
+            </a:endParaRPr>
+          </a:p>
+        </p:txBody>
+      </p:sp>
+      <p:sp>
+        <p:nvSpPr>
+          <p:cNvPr id="6" name="Rectangle 5"/>
+          <p:cNvSpPr/>
+          <p:nvPr/>
+        </p:nvSpPr>
+        <p:spPr>
+          <a:xfrm>
+            <a:off x="3811760" y="2912962"/>
+            <a:ext cx="1705551" cy="303427"/>
+          </a:xfrm>
+          <a:prstGeom prst="rect">
+            <a:avLst/>
+          </a:prstGeom>
+          <a:solidFill>
+            <a:schemeClr val="tx2">
+              <a:lumMod val="40000"/>
+              <a:lumOff val="60000"/>
+            </a:schemeClr>
+          </a:solidFill>
+          <a:ln>
+            <a:solidFill>
+              <a:schemeClr val="tx1"/>
+            </a:solidFill>
+          </a:ln>
+        </p:spPr>
+        <p:style>
+          <a:lnRef idx="1">
+            <a:schemeClr val="accent1"/>
+          </a:lnRef>
+          <a:fillRef idx="3">
+            <a:schemeClr val="accent1"/>
+          </a:fillRef>
+          <a:effectRef idx="2">
+            <a:schemeClr val="accent1"/>
+          </a:effectRef>
+          <a:fontRef idx="minor">
+            <a:schemeClr val="lt1"/>
+          </a:fontRef>
+        </p:style>
+        <p:txBody>
+          <a:bodyPr rtlCol="0" anchor="ctr"/>
+          <a:lstStyle/>
+          <a:p>
+            <a:pPr algn="ctr"/>
+            <a:r>
+              <a:rPr lang="en-US" sz="1600" dirty="0" err="1">
+                <a:solidFill>
+                  <a:schemeClr val="tx1"/>
+                </a:solidFill>
+              </a:rPr>
+              <a:t>InteractionPattern</a:t>
+            </a:r>
+            <a:endParaRPr lang="en-US" sz="1600" dirty="0">
+              <a:solidFill>
+                <a:schemeClr val="tx1"/>
+              </a:solidFill>
+            </a:endParaRPr>
+          </a:p>
+        </p:txBody>
+      </p:sp>
+      <p:sp>
+        <p:nvSpPr>
+          <p:cNvPr id="7" name="Rectangle 6"/>
+          <p:cNvSpPr/>
+          <p:nvPr/>
+        </p:nvSpPr>
+        <p:spPr>
+          <a:xfrm>
+            <a:off x="2946225" y="3661546"/>
+            <a:ext cx="1060597" cy="303427"/>
+          </a:xfrm>
+          <a:prstGeom prst="rect">
+            <a:avLst/>
+          </a:prstGeom>
+          <a:solidFill>
+            <a:schemeClr val="tx2">
+              <a:lumMod val="40000"/>
+              <a:lumOff val="60000"/>
+            </a:schemeClr>
+          </a:solidFill>
+          <a:ln>
+            <a:solidFill>
+              <a:schemeClr val="tx1"/>
+            </a:solidFill>
+          </a:ln>
+        </p:spPr>
+        <p:style>
+          <a:lnRef idx="1">
+            <a:schemeClr val="accent1"/>
+          </a:lnRef>
+          <a:fillRef idx="3">
+            <a:schemeClr val="accent1"/>
+          </a:fillRef>
+          <a:effectRef idx="2">
+            <a:schemeClr val="accent1"/>
+          </a:effectRef>
+          <a:fontRef idx="minor">
+            <a:schemeClr val="lt1"/>
+          </a:fontRef>
+        </p:style>
+        <p:txBody>
+          <a:bodyPr rtlCol="0" anchor="ctr"/>
+          <a:lstStyle/>
+          <a:p>
+            <a:pPr algn="ctr"/>
+            <a:r>
+              <a:rPr lang="en-US" sz="1600">
+                <a:solidFill>
+                  <a:schemeClr val="tx1"/>
+                </a:solidFill>
+              </a:rPr>
+              <a:t>IotAction</a:t>
+            </a:r>
+            <a:endParaRPr lang="en-US" sz="1600" dirty="0">
+              <a:solidFill>
+                <a:schemeClr val="tx1"/>
+              </a:solidFill>
+            </a:endParaRPr>
+          </a:p>
+        </p:txBody>
+      </p:sp>
+      <p:sp>
+        <p:nvSpPr>
+          <p:cNvPr id="8" name="Rectangle 7"/>
+          <p:cNvSpPr/>
+          <p:nvPr/>
+        </p:nvSpPr>
+        <p:spPr>
+          <a:xfrm>
+            <a:off x="4145273" y="3661547"/>
+            <a:ext cx="884016" cy="303427"/>
+          </a:xfrm>
+          <a:prstGeom prst="rect">
+            <a:avLst/>
+          </a:prstGeom>
+          <a:solidFill>
+            <a:schemeClr val="tx2">
+              <a:lumMod val="40000"/>
+              <a:lumOff val="60000"/>
+            </a:schemeClr>
+          </a:solidFill>
+          <a:ln>
+            <a:solidFill>
+              <a:schemeClr val="tx1"/>
+            </a:solidFill>
+          </a:ln>
+        </p:spPr>
+        <p:style>
+          <a:lnRef idx="1">
+            <a:schemeClr val="accent1"/>
+          </a:lnRef>
+          <a:fillRef idx="3">
+            <a:schemeClr val="accent1"/>
+          </a:fillRef>
+          <a:effectRef idx="2">
+            <a:schemeClr val="accent1"/>
+          </a:effectRef>
+          <a:fontRef idx="minor">
+            <a:schemeClr val="lt1"/>
+          </a:fontRef>
+        </p:style>
+        <p:txBody>
+          <a:bodyPr rtlCol="0" anchor="ctr"/>
+          <a:lstStyle/>
+          <a:p>
+            <a:pPr algn="ctr"/>
+            <a:r>
+              <a:rPr lang="en-US" sz="1600" dirty="0" err="1">
+                <a:solidFill>
+                  <a:schemeClr val="tx1"/>
+                </a:solidFill>
+              </a:rPr>
+              <a:t>IotEvent</a:t>
+            </a:r>
+            <a:endParaRPr lang="en-US" sz="1600" dirty="0">
+              <a:solidFill>
+                <a:schemeClr val="tx1"/>
+              </a:solidFill>
+            </a:endParaRPr>
+          </a:p>
+        </p:txBody>
+      </p:sp>
+      <p:sp>
+        <p:nvSpPr>
+          <p:cNvPr id="9" name="Rectangle 8"/>
+          <p:cNvSpPr/>
+          <p:nvPr/>
+        </p:nvSpPr>
+        <p:spPr>
+          <a:xfrm>
+            <a:off x="5122808" y="3661546"/>
+            <a:ext cx="1184475" cy="303427"/>
+          </a:xfrm>
+          <a:prstGeom prst="rect">
+            <a:avLst/>
+          </a:prstGeom>
+          <a:solidFill>
+            <a:schemeClr val="tx2">
+              <a:lumMod val="40000"/>
+              <a:lumOff val="60000"/>
+            </a:schemeClr>
+          </a:solidFill>
+          <a:ln>
+            <a:solidFill>
+              <a:schemeClr val="tx1"/>
+            </a:solidFill>
+          </a:ln>
+        </p:spPr>
+        <p:style>
+          <a:lnRef idx="1">
+            <a:schemeClr val="accent1"/>
+          </a:lnRef>
+          <a:fillRef idx="3">
+            <a:schemeClr val="accent1"/>
+          </a:fillRef>
+          <a:effectRef idx="2">
+            <a:schemeClr val="accent1"/>
+          </a:effectRef>
+          <a:fontRef idx="minor">
+            <a:schemeClr val="lt1"/>
+          </a:fontRef>
+        </p:style>
+        <p:txBody>
+          <a:bodyPr rtlCol="0" anchor="ctr"/>
+          <a:lstStyle/>
+          <a:p>
+            <a:pPr algn="ctr"/>
+            <a:r>
+              <a:rPr lang="en-US" sz="1600" dirty="0" err="1">
+                <a:solidFill>
+                  <a:schemeClr val="tx1"/>
+                </a:solidFill>
+              </a:rPr>
+              <a:t>IotProperty</a:t>
+            </a:r>
+            <a:endParaRPr lang="en-US" sz="1600" dirty="0">
+              <a:solidFill>
+                <a:schemeClr val="tx1"/>
+              </a:solidFill>
+            </a:endParaRPr>
+          </a:p>
+        </p:txBody>
+      </p:sp>
+      <p:cxnSp>
+        <p:nvCxnSpPr>
+          <p:cNvPr id="11" name="Straight Arrow Connector 10"/>
+          <p:cNvCxnSpPr/>
+          <p:nvPr/>
+        </p:nvCxnSpPr>
+        <p:spPr>
+          <a:xfrm flipV="1">
+            <a:off x="5517311" y="3064675"/>
+            <a:ext cx="1144111" cy="1"/>
+          </a:xfrm>
+          <a:prstGeom prst="straightConnector1">
+            <a:avLst/>
+          </a:prstGeom>
+          <a:ln w="19050" cmpd="sng">
+            <a:solidFill>
+              <a:srgbClr val="000000"/>
+            </a:solidFill>
+            <a:tailEnd type="stealth" w="lg" len="lg"/>
+          </a:ln>
+        </p:spPr>
+        <p:style>
+          <a:lnRef idx="2">
+            <a:schemeClr val="accent1"/>
+          </a:lnRef>
+          <a:fillRef idx="0">
+            <a:schemeClr val="accent1"/>
+          </a:fillRef>
+          <a:effectRef idx="1">
+            <a:schemeClr val="accent1"/>
+          </a:effectRef>
+          <a:fontRef idx="minor">
+            <a:schemeClr val="tx1"/>
+          </a:fontRef>
+        </p:style>
+      </p:cxnSp>
+      <p:sp>
+        <p:nvSpPr>
+          <p:cNvPr id="12" name="Rectangle 11"/>
+          <p:cNvSpPr/>
+          <p:nvPr/>
+        </p:nvSpPr>
+        <p:spPr>
+          <a:xfrm>
+            <a:off x="5324463" y="2599143"/>
+            <a:ext cx="1643079" cy="338554"/>
+          </a:xfrm>
+          <a:prstGeom prst="rect">
+            <a:avLst/>
+          </a:prstGeom>
+        </p:spPr>
+        <p:txBody>
+          <a:bodyPr wrap="none">
+            <a:spAutoFit/>
+          </a:bodyPr>
+          <a:lstStyle/>
+          <a:p>
+            <a:r>
+              <a:rPr lang="en-US" sz="1600" dirty="0" err="1">
+                <a:solidFill>
+                  <a:schemeClr val="tx1"/>
+                </a:solidFill>
+              </a:rPr>
+              <a:t>acceptsInputData</a:t>
+            </a:r>
+            <a:endParaRPr lang="en-US" sz="1600" dirty="0"/>
+          </a:p>
+        </p:txBody>
+      </p:sp>
+      <p:sp>
+        <p:nvSpPr>
+          <p:cNvPr id="13" name="Rectangle 12"/>
+          <p:cNvSpPr/>
+          <p:nvPr/>
+        </p:nvSpPr>
+        <p:spPr>
+          <a:xfrm>
+            <a:off x="5225658" y="2357826"/>
+            <a:ext cx="1881862" cy="338554"/>
+          </a:xfrm>
+          <a:prstGeom prst="rect">
+            <a:avLst/>
+          </a:prstGeom>
+        </p:spPr>
+        <p:txBody>
+          <a:bodyPr wrap="none">
+            <a:spAutoFit/>
+          </a:bodyPr>
+          <a:lstStyle/>
+          <a:p>
+            <a:r>
+              <a:rPr lang="en-US" sz="1600" dirty="0" err="1">
+                <a:solidFill>
+                  <a:schemeClr val="tx1"/>
+                </a:solidFill>
+              </a:rPr>
+              <a:t>providesOutputData</a:t>
+            </a:r>
+            <a:endParaRPr lang="en-US" sz="1600" dirty="0"/>
+          </a:p>
+        </p:txBody>
+      </p:sp>
+      <p:sp>
+        <p:nvSpPr>
+          <p:cNvPr id="14" name="Rectangle 13"/>
+          <p:cNvSpPr/>
+          <p:nvPr/>
+        </p:nvSpPr>
+        <p:spPr>
+          <a:xfrm>
+            <a:off x="2244150" y="2579983"/>
+            <a:ext cx="2421689" cy="338554"/>
+          </a:xfrm>
+          <a:prstGeom prst="rect">
+            <a:avLst/>
+          </a:prstGeom>
+        </p:spPr>
+        <p:txBody>
+          <a:bodyPr wrap="none">
+            <a:spAutoFit/>
+          </a:bodyPr>
+          <a:lstStyle/>
+          <a:p>
+            <a:r>
+              <a:rPr lang="en-US" sz="1600" dirty="0" err="1">
+                <a:solidFill>
+                  <a:schemeClr val="tx1"/>
+                </a:solidFill>
+              </a:rPr>
+              <a:t>providesInteractionPattern</a:t>
+            </a:r>
+            <a:endParaRPr lang="en-US" sz="1600" dirty="0"/>
+          </a:p>
+        </p:txBody>
+      </p:sp>
+      <p:cxnSp>
+        <p:nvCxnSpPr>
+          <p:cNvPr id="15" name="Straight Arrow Connector 14"/>
+          <p:cNvCxnSpPr/>
+          <p:nvPr/>
+        </p:nvCxnSpPr>
+        <p:spPr>
+          <a:xfrm>
+            <a:off x="1244638" y="4596454"/>
+            <a:ext cx="521916" cy="0"/>
+          </a:xfrm>
+          <a:prstGeom prst="straightConnector1">
+            <a:avLst/>
+          </a:prstGeom>
+          <a:ln w="19050" cmpd="sng">
+            <a:solidFill>
+              <a:srgbClr val="000000"/>
+            </a:solidFill>
+            <a:tailEnd type="triangle" w="lg" len="lg"/>
+          </a:ln>
+        </p:spPr>
+        <p:style>
+          <a:lnRef idx="2">
+            <a:schemeClr val="accent1"/>
+          </a:lnRef>
+          <a:fillRef idx="0">
+            <a:schemeClr val="accent1"/>
+          </a:fillRef>
+          <a:effectRef idx="1">
+            <a:schemeClr val="accent1"/>
+          </a:effectRef>
+          <a:fontRef idx="minor">
+            <a:schemeClr val="tx1"/>
+          </a:fontRef>
+        </p:style>
+      </p:cxnSp>
+      <p:cxnSp>
+        <p:nvCxnSpPr>
+          <p:cNvPr id="16" name="Straight Arrow Connector 15"/>
+          <p:cNvCxnSpPr/>
+          <p:nvPr/>
+        </p:nvCxnSpPr>
+        <p:spPr>
+          <a:xfrm>
+            <a:off x="1236572" y="4952414"/>
+            <a:ext cx="528208" cy="1"/>
+          </a:xfrm>
+          <a:prstGeom prst="straightConnector1">
+            <a:avLst/>
+          </a:prstGeom>
+          <a:ln w="19050" cmpd="sng">
+            <a:solidFill>
+              <a:srgbClr val="000000"/>
+            </a:solidFill>
+            <a:tailEnd type="stealth" w="lg" len="lg"/>
+          </a:ln>
+        </p:spPr>
+        <p:style>
+          <a:lnRef idx="2">
+            <a:schemeClr val="accent1"/>
+          </a:lnRef>
+          <a:fillRef idx="0">
+            <a:schemeClr val="accent1"/>
+          </a:fillRef>
+          <a:effectRef idx="1">
+            <a:schemeClr val="accent1"/>
+          </a:effectRef>
+          <a:fontRef idx="minor">
+            <a:schemeClr val="tx1"/>
+          </a:fontRef>
+        </p:style>
+      </p:cxnSp>
+      <p:sp>
+        <p:nvSpPr>
+          <p:cNvPr id="17" name="Rectangle 16"/>
+          <p:cNvSpPr/>
+          <p:nvPr/>
+        </p:nvSpPr>
+        <p:spPr>
+          <a:xfrm>
+            <a:off x="1781722" y="4420089"/>
+            <a:ext cx="1290725" cy="307777"/>
+          </a:xfrm>
+          <a:prstGeom prst="rect">
+            <a:avLst/>
+          </a:prstGeom>
+        </p:spPr>
+        <p:txBody>
+          <a:bodyPr wrap="none">
+            <a:spAutoFit/>
+          </a:bodyPr>
+          <a:lstStyle/>
+          <a:p>
+            <a:r>
+              <a:rPr lang="en-US" sz="1400">
+                <a:solidFill>
+                  <a:schemeClr val="tx1"/>
+                </a:solidFill>
+              </a:rPr>
+              <a:t>rdfs:subclassOf</a:t>
+            </a:r>
+            <a:endParaRPr lang="en-US" sz="1400"/>
+          </a:p>
+        </p:txBody>
+      </p:sp>
+      <p:sp>
+        <p:nvSpPr>
+          <p:cNvPr id="18" name="Rectangle 17"/>
+          <p:cNvSpPr/>
+          <p:nvPr/>
+        </p:nvSpPr>
+        <p:spPr>
+          <a:xfrm>
+            <a:off x="1781722" y="4767556"/>
+            <a:ext cx="1429586" cy="307777"/>
+          </a:xfrm>
+          <a:prstGeom prst="rect">
+            <a:avLst/>
+          </a:prstGeom>
+        </p:spPr>
+        <p:txBody>
+          <a:bodyPr wrap="none">
+            <a:spAutoFit/>
+          </a:bodyPr>
+          <a:lstStyle/>
+          <a:p>
+            <a:r>
+              <a:rPr lang="en-US" sz="1400" dirty="0" err="1"/>
+              <a:t>schema:Property</a:t>
+            </a:r>
+            <a:endParaRPr lang="en-US" sz="1400" dirty="0"/>
+          </a:p>
+        </p:txBody>
+      </p:sp>
+      <p:sp>
+        <p:nvSpPr>
+          <p:cNvPr id="19" name="Rectangle 18"/>
+          <p:cNvSpPr/>
+          <p:nvPr/>
+        </p:nvSpPr>
+        <p:spPr>
+          <a:xfrm>
+            <a:off x="1240674" y="5252981"/>
+            <a:ext cx="1705551" cy="303427"/>
+          </a:xfrm>
+          <a:prstGeom prst="rect">
+            <a:avLst/>
+          </a:prstGeom>
+          <a:solidFill>
+            <a:schemeClr val="tx2">
+              <a:lumMod val="40000"/>
+              <a:lumOff val="60000"/>
+            </a:schemeClr>
+          </a:solidFill>
+          <a:ln>
+            <a:solidFill>
+              <a:schemeClr val="tx1"/>
+            </a:solidFill>
+          </a:ln>
+        </p:spPr>
+        <p:style>
+          <a:lnRef idx="1">
+            <a:schemeClr val="accent1"/>
+          </a:lnRef>
+          <a:fillRef idx="3">
+            <a:schemeClr val="accent1"/>
+          </a:fillRef>
+          <a:effectRef idx="2">
+            <a:schemeClr val="accent1"/>
+          </a:effectRef>
+          <a:fontRef idx="minor">
+            <a:schemeClr val="lt1"/>
+          </a:fontRef>
+        </p:style>
+        <p:txBody>
+          <a:bodyPr rtlCol="0" anchor="ctr"/>
+          <a:lstStyle/>
+          <a:p>
+            <a:pPr algn="ctr"/>
+            <a:r>
+              <a:rPr lang="en-US" sz="1400">
+                <a:solidFill>
+                  <a:schemeClr val="tx1"/>
+                </a:solidFill>
+              </a:rPr>
+              <a:t>iotschema Class</a:t>
+            </a:r>
+          </a:p>
+        </p:txBody>
+      </p:sp>
+      <p:sp>
+        <p:nvSpPr>
+          <p:cNvPr id="20" name="Rectangle 19"/>
+          <p:cNvSpPr/>
+          <p:nvPr/>
+        </p:nvSpPr>
+        <p:spPr>
+          <a:xfrm>
+            <a:off x="1240674" y="5677851"/>
+            <a:ext cx="1705551" cy="303427"/>
+          </a:xfrm>
+          <a:prstGeom prst="rect">
+            <a:avLst/>
+          </a:prstGeom>
+          <a:noFill/>
+          <a:ln>
+            <a:solidFill>
+              <a:schemeClr val="tx1"/>
+            </a:solidFill>
+          </a:ln>
+        </p:spPr>
+        <p:style>
+          <a:lnRef idx="1">
+            <a:schemeClr val="accent1"/>
+          </a:lnRef>
+          <a:fillRef idx="3">
+            <a:schemeClr val="accent1"/>
+          </a:fillRef>
+          <a:effectRef idx="2">
+            <a:schemeClr val="accent1"/>
+          </a:effectRef>
+          <a:fontRef idx="minor">
+            <a:schemeClr val="lt1"/>
+          </a:fontRef>
+        </p:style>
+        <p:txBody>
+          <a:bodyPr rtlCol="0" anchor="ctr"/>
+          <a:lstStyle/>
+          <a:p>
+            <a:pPr algn="ctr"/>
+            <a:r>
+              <a:rPr lang="en-US" sz="1400">
+                <a:solidFill>
+                  <a:schemeClr val="tx1"/>
+                </a:solidFill>
+              </a:rPr>
+              <a:t>Reused Class</a:t>
+            </a:r>
+          </a:p>
+        </p:txBody>
+      </p:sp>
+      <p:sp>
+        <p:nvSpPr>
+          <p:cNvPr id="21" name="Rectangle 20"/>
+          <p:cNvSpPr/>
+          <p:nvPr/>
+        </p:nvSpPr>
+        <p:spPr>
+          <a:xfrm>
+            <a:off x="942160" y="4309472"/>
+            <a:ext cx="2397970" cy="1821167"/>
+          </a:xfrm>
+          <a:prstGeom prst="rect">
+            <a:avLst/>
+          </a:prstGeom>
+          <a:noFill/>
+          <a:ln>
+            <a:solidFill>
+              <a:srgbClr val="000000"/>
+            </a:solidFill>
+            <a:prstDash val="lgDash"/>
+          </a:ln>
+        </p:spPr>
+        <p:style>
+          <a:lnRef idx="1">
+            <a:schemeClr val="accent1"/>
+          </a:lnRef>
+          <a:fillRef idx="3">
+            <a:schemeClr val="accent1"/>
+          </a:fillRef>
+          <a:effectRef idx="2">
+            <a:schemeClr val="accent1"/>
+          </a:effectRef>
+          <a:fontRef idx="minor">
+            <a:schemeClr val="lt1"/>
+          </a:fontRef>
+        </p:style>
+        <p:txBody>
+          <a:bodyPr rtlCol="0" anchor="ctr"/>
+          <a:lstStyle/>
+          <a:p>
+            <a:pPr algn="ctr"/>
+            <a:endParaRPr lang="en-US"/>
+          </a:p>
+        </p:txBody>
+      </p:sp>
+      <p:sp>
+        <p:nvSpPr>
+          <p:cNvPr id="22" name="Rectangle 21"/>
+          <p:cNvSpPr/>
+          <p:nvPr/>
+        </p:nvSpPr>
+        <p:spPr>
+          <a:xfrm>
+            <a:off x="6661422" y="2912961"/>
+            <a:ext cx="1705551" cy="303427"/>
+          </a:xfrm>
+          <a:prstGeom prst="rect">
+            <a:avLst/>
+          </a:prstGeom>
+          <a:solidFill>
+            <a:schemeClr val="tx2">
+              <a:lumMod val="40000"/>
+              <a:lumOff val="60000"/>
+            </a:schemeClr>
+          </a:solidFill>
+          <a:ln>
+            <a:solidFill>
+              <a:schemeClr val="tx1"/>
+            </a:solidFill>
+          </a:ln>
+        </p:spPr>
+        <p:style>
+          <a:lnRef idx="1">
+            <a:schemeClr val="accent1"/>
+          </a:lnRef>
+          <a:fillRef idx="3">
+            <a:schemeClr val="accent1"/>
+          </a:fillRef>
+          <a:effectRef idx="2">
+            <a:schemeClr val="accent1"/>
+          </a:effectRef>
+          <a:fontRef idx="minor">
+            <a:schemeClr val="lt1"/>
+          </a:fontRef>
+        </p:style>
+        <p:txBody>
+          <a:bodyPr rtlCol="0" anchor="ctr"/>
+          <a:lstStyle/>
+          <a:p>
+            <a:pPr algn="ctr"/>
+            <a:r>
+              <a:rPr lang="en-US" sz="1600" dirty="0" err="1">
+                <a:solidFill>
+                  <a:schemeClr val="tx1"/>
+                </a:solidFill>
+              </a:rPr>
+              <a:t>IotDataItem</a:t>
+            </a:r>
+            <a:endParaRPr lang="en-US" sz="1600" dirty="0">
+              <a:solidFill>
+                <a:schemeClr val="tx1"/>
+              </a:solidFill>
+            </a:endParaRPr>
+          </a:p>
+        </p:txBody>
+      </p:sp>
+      <p:cxnSp>
+        <p:nvCxnSpPr>
+          <p:cNvPr id="23" name="Straight Arrow Connector 22"/>
+          <p:cNvCxnSpPr/>
+          <p:nvPr/>
+        </p:nvCxnSpPr>
+        <p:spPr>
+          <a:xfrm flipH="1">
+            <a:off x="3569798" y="3431842"/>
+            <a:ext cx="1586" cy="231072"/>
+          </a:xfrm>
+          <a:prstGeom prst="straightConnector1">
+            <a:avLst/>
+          </a:prstGeom>
+          <a:ln w="19050" cmpd="sng">
+            <a:solidFill>
+              <a:schemeClr val="tx1"/>
+            </a:solidFill>
+            <a:tailEnd type="triangle" w="lg" len="lg"/>
+          </a:ln>
+        </p:spPr>
+        <p:style>
+          <a:lnRef idx="2">
+            <a:schemeClr val="accent1"/>
+          </a:lnRef>
+          <a:fillRef idx="0">
+            <a:schemeClr val="accent1"/>
+          </a:fillRef>
+          <a:effectRef idx="1">
+            <a:schemeClr val="accent1"/>
+          </a:effectRef>
+          <a:fontRef idx="minor">
+            <a:schemeClr val="tx1"/>
+          </a:fontRef>
+        </p:style>
+      </p:cxnSp>
+      <p:cxnSp>
+        <p:nvCxnSpPr>
+          <p:cNvPr id="24" name="Straight Arrow Connector 23"/>
+          <p:cNvCxnSpPr/>
+          <p:nvPr/>
+        </p:nvCxnSpPr>
+        <p:spPr>
+          <a:xfrm flipH="1">
+            <a:off x="5739489" y="3430474"/>
+            <a:ext cx="1586" cy="231072"/>
+          </a:xfrm>
+          <a:prstGeom prst="straightConnector1">
+            <a:avLst/>
+          </a:prstGeom>
+          <a:ln w="19050" cmpd="sng">
+            <a:solidFill>
+              <a:schemeClr val="tx1"/>
+            </a:solidFill>
+            <a:tailEnd type="triangle" w="lg" len="lg"/>
+          </a:ln>
+        </p:spPr>
+        <p:style>
+          <a:lnRef idx="2">
+            <a:schemeClr val="accent1"/>
+          </a:lnRef>
+          <a:fillRef idx="0">
+            <a:schemeClr val="accent1"/>
+          </a:fillRef>
+          <a:effectRef idx="1">
+            <a:schemeClr val="accent1"/>
+          </a:effectRef>
+          <a:fontRef idx="minor">
+            <a:schemeClr val="tx1"/>
+          </a:fontRef>
+        </p:style>
+      </p:cxnSp>
+      <p:cxnSp>
+        <p:nvCxnSpPr>
+          <p:cNvPr id="25" name="Straight Arrow Connector 24"/>
+          <p:cNvCxnSpPr/>
+          <p:nvPr/>
+        </p:nvCxnSpPr>
+        <p:spPr>
+          <a:xfrm flipH="1">
+            <a:off x="4660650" y="3430474"/>
+            <a:ext cx="1586" cy="231072"/>
+          </a:xfrm>
+          <a:prstGeom prst="straightConnector1">
+            <a:avLst/>
+          </a:prstGeom>
+          <a:ln w="19050" cmpd="sng">
+            <a:solidFill>
+              <a:schemeClr val="tx1"/>
+            </a:solidFill>
+            <a:tailEnd type="triangle" w="lg" len="lg"/>
+          </a:ln>
+        </p:spPr>
+        <p:style>
+          <a:lnRef idx="2">
+            <a:schemeClr val="accent1"/>
+          </a:lnRef>
+          <a:fillRef idx="0">
+            <a:schemeClr val="accent1"/>
+          </a:fillRef>
+          <a:effectRef idx="1">
+            <a:schemeClr val="accent1"/>
+          </a:effectRef>
+          <a:fontRef idx="minor">
+            <a:schemeClr val="tx1"/>
+          </a:fontRef>
+        </p:style>
+      </p:cxnSp>
+      <p:cxnSp>
+        <p:nvCxnSpPr>
+          <p:cNvPr id="26" name="Straight Arrow Connector 25"/>
+          <p:cNvCxnSpPr/>
+          <p:nvPr/>
+        </p:nvCxnSpPr>
+        <p:spPr>
+          <a:xfrm flipH="1">
+            <a:off x="3577230" y="3435702"/>
+            <a:ext cx="2162259" cy="0"/>
+          </a:xfrm>
+          <a:prstGeom prst="straightConnector1">
+            <a:avLst/>
+          </a:prstGeom>
+          <a:ln w="19050" cmpd="sng">
+            <a:solidFill>
+              <a:schemeClr val="tx1"/>
+            </a:solidFill>
+            <a:headEnd type="none" w="med" len="med"/>
+            <a:tailEnd type="none" w="med" len="med"/>
+          </a:ln>
+        </p:spPr>
+        <p:style>
+          <a:lnRef idx="2">
+            <a:schemeClr val="accent1"/>
+          </a:lnRef>
+          <a:fillRef idx="0">
+            <a:schemeClr val="accent1"/>
+          </a:fillRef>
+          <a:effectRef idx="1">
+            <a:schemeClr val="accent1"/>
+          </a:effectRef>
+          <a:fontRef idx="minor">
+            <a:schemeClr val="tx1"/>
+          </a:fontRef>
+        </p:style>
+      </p:cxnSp>
+      <p:cxnSp>
+        <p:nvCxnSpPr>
+          <p:cNvPr id="27" name="Straight Arrow Connector 26"/>
+          <p:cNvCxnSpPr/>
+          <p:nvPr/>
+        </p:nvCxnSpPr>
+        <p:spPr>
+          <a:xfrm flipV="1">
+            <a:off x="4669882" y="3216389"/>
+            <a:ext cx="1" cy="223174"/>
+          </a:xfrm>
+          <a:prstGeom prst="straightConnector1">
+            <a:avLst/>
+          </a:prstGeom>
+          <a:ln w="19050" cmpd="sng">
+            <a:solidFill>
+              <a:schemeClr val="tx1"/>
+            </a:solidFill>
+            <a:headEnd type="none"/>
+            <a:tailEnd type="none" w="lg" len="lg"/>
+          </a:ln>
+        </p:spPr>
+        <p:style>
+          <a:lnRef idx="2">
+            <a:schemeClr val="accent1"/>
+          </a:lnRef>
+          <a:fillRef idx="0">
+            <a:schemeClr val="accent1"/>
+          </a:fillRef>
+          <a:effectRef idx="1">
+            <a:schemeClr val="accent1"/>
+          </a:effectRef>
+          <a:fontRef idx="minor">
+            <a:schemeClr val="tx1"/>
+          </a:fontRef>
+        </p:style>
+      </p:cxnSp>
+      <p:sp>
+        <p:nvSpPr>
+          <p:cNvPr id="29" name="Rectangle 28"/>
+          <p:cNvSpPr/>
+          <p:nvPr/>
+        </p:nvSpPr>
+        <p:spPr>
+          <a:xfrm>
+            <a:off x="6387243" y="3519817"/>
+            <a:ext cx="2256228" cy="303427"/>
+          </a:xfrm>
+          <a:prstGeom prst="rect">
+            <a:avLst/>
+          </a:prstGeom>
+          <a:solidFill>
+            <a:srgbClr val="FFFFFF"/>
+          </a:solidFill>
+          <a:ln>
+            <a:solidFill>
+              <a:schemeClr val="tx1"/>
+            </a:solidFill>
+          </a:ln>
+        </p:spPr>
+        <p:style>
+          <a:lnRef idx="1">
+            <a:schemeClr val="accent1"/>
+          </a:lnRef>
+          <a:fillRef idx="3">
+            <a:schemeClr val="accent1"/>
+          </a:fillRef>
+          <a:effectRef idx="2">
+            <a:schemeClr val="accent1"/>
+          </a:effectRef>
+          <a:fontRef idx="minor">
+            <a:schemeClr val="lt1"/>
+          </a:fontRef>
+        </p:style>
+        <p:txBody>
+          <a:bodyPr rtlCol="0" anchor="ctr"/>
+          <a:lstStyle/>
+          <a:p>
+            <a:pPr algn="ctr"/>
+            <a:r>
+              <a:rPr lang="en-US" sz="1400">
+                <a:solidFill>
+                  <a:schemeClr val="tx1"/>
+                </a:solidFill>
+              </a:rPr>
+              <a:t>schema:PropertyValue</a:t>
+            </a:r>
+          </a:p>
+        </p:txBody>
+      </p:sp>
+      <p:sp>
+        <p:nvSpPr>
+          <p:cNvPr id="30" name="Rectangle 29"/>
+          <p:cNvSpPr/>
+          <p:nvPr/>
+        </p:nvSpPr>
+        <p:spPr>
+          <a:xfrm>
+            <a:off x="6387243" y="3838244"/>
+            <a:ext cx="2256229" cy="303427"/>
+          </a:xfrm>
+          <a:prstGeom prst="rect">
+            <a:avLst/>
+          </a:prstGeom>
+          <a:solidFill>
+            <a:srgbClr val="FFFFFF"/>
+          </a:solidFill>
+          <a:ln>
+            <a:solidFill>
+              <a:schemeClr val="tx1"/>
+            </a:solidFill>
+          </a:ln>
+        </p:spPr>
+        <p:style>
+          <a:lnRef idx="1">
+            <a:schemeClr val="accent1"/>
+          </a:lnRef>
+          <a:fillRef idx="3">
+            <a:schemeClr val="accent1"/>
+          </a:fillRef>
+          <a:effectRef idx="2">
+            <a:schemeClr val="accent1"/>
+          </a:effectRef>
+          <a:fontRef idx="minor">
+            <a:schemeClr val="lt1"/>
+          </a:fontRef>
+        </p:style>
+        <p:txBody>
+          <a:bodyPr rtlCol="0" anchor="ctr"/>
+          <a:lstStyle/>
+          <a:p>
+            <a:pPr algn="ctr"/>
+            <a:r>
+              <a:rPr lang="en-US" sz="1400">
+                <a:solidFill>
+                  <a:schemeClr val="tx1"/>
+                </a:solidFill>
+              </a:rPr>
+              <a:t>schema:PropertyValueSpec</a:t>
+            </a:r>
+            <a:r>
+              <a:rPr lang="en-US" sz="1400" dirty="0">
+                <a:solidFill>
+                  <a:schemeClr val="tx1"/>
+                </a:solidFill>
+              </a:rPr>
+              <a:t>.</a:t>
+            </a:r>
+          </a:p>
+        </p:txBody>
+      </p:sp>
+      <p:cxnSp>
+        <p:nvCxnSpPr>
+          <p:cNvPr id="31" name="Straight Arrow Connector 30"/>
+          <p:cNvCxnSpPr>
+            <a:endCxn id="30" idx="0"/>
+          </p:cNvCxnSpPr>
+          <p:nvPr/>
+        </p:nvCxnSpPr>
+        <p:spPr>
+          <a:xfrm>
+            <a:off x="7514198" y="3216388"/>
+            <a:ext cx="1159" cy="303429"/>
+          </a:xfrm>
+          <a:prstGeom prst="straightConnector1">
+            <a:avLst/>
+          </a:prstGeom>
+          <a:ln w="19050" cmpd="sng">
+            <a:solidFill>
+              <a:srgbClr val="000000"/>
+            </a:solidFill>
+            <a:tailEnd type="stealth" w="lg" len="lg"/>
+          </a:ln>
+        </p:spPr>
+        <p:style>
+          <a:lnRef idx="2">
+            <a:schemeClr val="accent1"/>
+          </a:lnRef>
+          <a:fillRef idx="0">
+            <a:schemeClr val="accent1"/>
+          </a:fillRef>
+          <a:effectRef idx="1">
+            <a:schemeClr val="accent1"/>
+          </a:effectRef>
+          <a:fontRef idx="minor">
+            <a:schemeClr val="tx1"/>
+          </a:fontRef>
+        </p:style>
+      </p:cxnSp>
+      <p:cxnSp>
+        <p:nvCxnSpPr>
+          <p:cNvPr id="32" name="Straight Arrow Connector 31"/>
+          <p:cNvCxnSpPr>
+            <a:endCxn id="6" idx="1"/>
+          </p:cNvCxnSpPr>
+          <p:nvPr/>
+        </p:nvCxnSpPr>
+        <p:spPr>
+          <a:xfrm flipV="1">
+            <a:off x="2717185" y="3064676"/>
+            <a:ext cx="1094575" cy="9913"/>
+          </a:xfrm>
+          <a:prstGeom prst="straightConnector1">
+            <a:avLst/>
+          </a:prstGeom>
+          <a:ln w="19050" cmpd="sng">
+            <a:solidFill>
+              <a:srgbClr val="000000"/>
+            </a:solidFill>
+            <a:tailEnd type="stealth" w="lg" len="lg"/>
+          </a:ln>
+        </p:spPr>
+        <p:style>
+          <a:lnRef idx="2">
+            <a:schemeClr val="accent1"/>
+          </a:lnRef>
+          <a:fillRef idx="0">
+            <a:schemeClr val="accent1"/>
+          </a:fillRef>
+          <a:effectRef idx="1">
+            <a:schemeClr val="accent1"/>
+          </a:effectRef>
+          <a:fontRef idx="minor">
+            <a:schemeClr val="tx1"/>
+          </a:fontRef>
+        </p:style>
+      </p:cxnSp>
+      <p:cxnSp>
+        <p:nvCxnSpPr>
+          <p:cNvPr id="34" name="Straight Arrow Connector 33"/>
+          <p:cNvCxnSpPr>
+            <a:stCxn id="35" idx="2"/>
+            <a:endCxn id="5" idx="0"/>
+          </p:cNvCxnSpPr>
+          <p:nvPr/>
+        </p:nvCxnSpPr>
+        <p:spPr>
+          <a:xfrm>
+            <a:off x="1852382" y="2319110"/>
+            <a:ext cx="2513" cy="593852"/>
+          </a:xfrm>
+          <a:prstGeom prst="straightConnector1">
+            <a:avLst/>
+          </a:prstGeom>
+          <a:ln w="19050" cmpd="sng">
+            <a:solidFill>
+              <a:srgbClr val="000000"/>
+            </a:solidFill>
+            <a:tailEnd type="triangle" w="lg" len="lg"/>
+          </a:ln>
+        </p:spPr>
+        <p:style>
+          <a:lnRef idx="2">
+            <a:schemeClr val="accent1"/>
+          </a:lnRef>
+          <a:fillRef idx="0">
+            <a:schemeClr val="accent1"/>
+          </a:fillRef>
+          <a:effectRef idx="1">
+            <a:schemeClr val="accent1"/>
+          </a:effectRef>
+          <a:fontRef idx="minor">
+            <a:schemeClr val="tx1"/>
+          </a:fontRef>
+        </p:style>
+      </p:cxnSp>
+      <p:sp>
+        <p:nvSpPr>
+          <p:cNvPr id="35" name="Rectangle 34"/>
+          <p:cNvSpPr/>
+          <p:nvPr/>
+        </p:nvSpPr>
+        <p:spPr>
+          <a:xfrm>
+            <a:off x="999606" y="2015683"/>
+            <a:ext cx="1705551" cy="303427"/>
+          </a:xfrm>
+          <a:prstGeom prst="rect">
+            <a:avLst/>
+          </a:prstGeom>
+          <a:solidFill>
+            <a:schemeClr val="tx2">
+              <a:lumMod val="40000"/>
+              <a:lumOff val="60000"/>
+            </a:schemeClr>
+          </a:solidFill>
+          <a:ln>
+            <a:solidFill>
+              <a:schemeClr val="tx1"/>
+            </a:solidFill>
+          </a:ln>
+        </p:spPr>
+        <p:style>
+          <a:lnRef idx="1">
+            <a:schemeClr val="accent1"/>
+          </a:lnRef>
+          <a:fillRef idx="3">
+            <a:schemeClr val="accent1"/>
+          </a:fillRef>
+          <a:effectRef idx="2">
+            <a:schemeClr val="accent1"/>
+          </a:effectRef>
+          <a:fontRef idx="minor">
+            <a:schemeClr val="lt1"/>
+          </a:fontRef>
+        </p:style>
+        <p:txBody>
+          <a:bodyPr rtlCol="0" anchor="ctr"/>
+          <a:lstStyle/>
+          <a:p>
+            <a:pPr algn="ctr"/>
+            <a:r>
+              <a:rPr lang="en-US" sz="1600" dirty="0" err="1">
+                <a:solidFill>
+                  <a:schemeClr val="tx1"/>
+                </a:solidFill>
+              </a:rPr>
+              <a:t>IotThing</a:t>
+            </a:r>
+            <a:endParaRPr lang="en-US" sz="1600" dirty="0">
+              <a:solidFill>
+                <a:schemeClr val="tx1"/>
+              </a:solidFill>
+            </a:endParaRPr>
+          </a:p>
+        </p:txBody>
+      </p:sp>
+      <p:sp>
+        <p:nvSpPr>
+          <p:cNvPr id="36" name="Rectangle 35"/>
+          <p:cNvSpPr/>
+          <p:nvPr/>
+        </p:nvSpPr>
+        <p:spPr>
+          <a:xfrm>
+            <a:off x="332413" y="2319271"/>
+            <a:ext cx="1519968" cy="584775"/>
+          </a:xfrm>
+          <a:prstGeom prst="rect">
+            <a:avLst/>
+          </a:prstGeom>
+        </p:spPr>
+        <p:txBody>
+          <a:bodyPr wrap="none">
+            <a:spAutoFit/>
+          </a:bodyPr>
+          <a:lstStyle/>
+          <a:p>
+            <a:pPr algn="r"/>
+            <a:r>
+              <a:rPr lang="en-US" sz="1600" dirty="0" err="1"/>
+              <a:t>hasIotThing</a:t>
+            </a:r>
+            <a:endParaRPr lang="en-US" sz="1600" dirty="0"/>
+          </a:p>
+          <a:p>
+            <a:pPr algn="r"/>
+            <a:r>
+              <a:rPr lang="en-US" sz="1600" dirty="0" err="1">
+                <a:solidFill>
+                  <a:schemeClr val="tx1"/>
+                </a:solidFill>
+              </a:rPr>
+              <a:t>hasIotCapability</a:t>
+            </a:r>
+            <a:endParaRPr lang="en-US" sz="1600" dirty="0">
+              <a:solidFill>
+                <a:schemeClr val="tx1"/>
+              </a:solidFill>
+            </a:endParaRPr>
+          </a:p>
+        </p:txBody>
+      </p:sp>
+      <p:cxnSp>
+        <p:nvCxnSpPr>
+          <p:cNvPr id="37" name="Straight Arrow Connector 36"/>
+          <p:cNvCxnSpPr>
+            <a:stCxn id="4" idx="1"/>
+            <a:endCxn id="35" idx="3"/>
+          </p:cNvCxnSpPr>
+          <p:nvPr/>
+        </p:nvCxnSpPr>
+        <p:spPr>
+          <a:xfrm flipH="1">
+            <a:off x="2705157" y="2167120"/>
+            <a:ext cx="562236" cy="277"/>
+          </a:xfrm>
+          <a:prstGeom prst="straightConnector1">
+            <a:avLst/>
+          </a:prstGeom>
+          <a:ln w="19050" cmpd="sng">
+            <a:solidFill>
+              <a:srgbClr val="000000"/>
+            </a:solidFill>
+            <a:tailEnd type="triangle" w="lg" len="lg"/>
+          </a:ln>
+        </p:spPr>
+        <p:style>
+          <a:lnRef idx="2">
+            <a:schemeClr val="accent1"/>
+          </a:lnRef>
+          <a:fillRef idx="0">
+            <a:schemeClr val="accent1"/>
+          </a:fillRef>
+          <a:effectRef idx="1">
+            <a:schemeClr val="accent1"/>
+          </a:effectRef>
+          <a:fontRef idx="minor">
+            <a:schemeClr val="tx1"/>
+          </a:fontRef>
+        </p:style>
+      </p:cxnSp>
     </p:spTree>
     <p:extLst>
       <p:ext uri="{BB962C8B-B14F-4D97-AF65-F5344CB8AC3E}">
-        <p14:creationId xmlns:p14="http://schemas.microsoft.com/office/powerpoint/2010/main" val="1144329561"/>
+        <p14:creationId xmlns:p14="http://schemas.microsoft.com/office/powerpoint/2010/main" val="348101098"/>
       </p:ext>
     </p:extLst>
   </p:cSld>

</xml_diff>